<commit_message>
Fixed several requests subscribing + demo v2
</commit_message>
<xml_diff>
--- a/Demonstration/Demo_JXS.pptx
+++ b/Demonstration/Demo_JXS.pptx
@@ -215,7 +215,7 @@
           <a:p>
             <a:fld id="{57DD73B3-A2CE-47CB-99A8-4EA99245B351}" type="datetimeFigureOut">
               <a:rPr lang="fr-FR" smtClean="0"/>
-              <a:t>04/05/2017</a:t>
+              <a:t>05/05/2017</a:t>
             </a:fld>
             <a:endParaRPr lang="fr-FR"/>
           </a:p>
@@ -617,7 +617,7 @@
           <a:p>
             <a:r>
               <a:rPr lang="fr-FR" dirty="0" smtClean="0"/>
-              <a:t>Florent</a:t>
+              <a:t>Yoann</a:t>
             </a:r>
             <a:endParaRPr lang="fr-FR" dirty="0"/>
           </a:p>
@@ -704,8 +704,8 @@
           <a:lstStyle/>
           <a:p>
             <a:r>
-              <a:rPr lang="fr-FR" dirty="0" err="1" smtClean="0"/>
-              <a:t>Mehidine</a:t>
+              <a:rPr lang="fr-FR" dirty="0" smtClean="0"/>
+              <a:t>Alexis</a:t>
             </a:r>
             <a:endParaRPr lang="fr-FR" dirty="0"/>
           </a:p>
@@ -793,7 +793,7 @@
           <a:p>
             <a:r>
               <a:rPr lang="fr-FR" dirty="0" smtClean="0"/>
-              <a:t>Dylan</a:t>
+              <a:t>Florent</a:t>
             </a:r>
             <a:endParaRPr lang="fr-FR" dirty="0"/>
           </a:p>
@@ -881,7 +881,7 @@
           <a:p>
             <a:r>
               <a:rPr lang="fr-FR" dirty="0" smtClean="0"/>
-              <a:t>Dylan</a:t>
+              <a:t>Florent</a:t>
             </a:r>
             <a:endParaRPr lang="fr-FR" dirty="0"/>
           </a:p>
@@ -969,7 +969,7 @@
           <a:p>
             <a:r>
               <a:rPr lang="fr-FR" dirty="0" smtClean="0"/>
-              <a:t>Yoann</a:t>
+              <a:t>Alexis</a:t>
             </a:r>
             <a:endParaRPr lang="fr-FR" dirty="0"/>
           </a:p>
@@ -1961,21 +1961,10 @@
               </a:path>
             </a:pathLst>
           </a:custGeom>
-          <a:gradFill flip="none" rotWithShape="1">
-            <a:gsLst>
-              <a:gs pos="38000">
-                <a:schemeClr val="accent1">
-                  <a:lumMod val="5000"/>
-                  <a:lumOff val="95000"/>
-                </a:schemeClr>
-              </a:gs>
-              <a:gs pos="100000">
-                <a:srgbClr val="F4E9FD"/>
-              </a:gs>
-            </a:gsLst>
-            <a:lin ang="2700000" scaled="1"/>
-            <a:tileRect/>
-          </a:gradFill>
+          <a:blipFill>
+            <a:blip r:embed="rId2"/>
+            <a:tile tx="0" ty="0" sx="100000" sy="100000" flip="none" algn="tl"/>
+          </a:blipFill>
           <a:ln>
             <a:noFill/>
           </a:ln>
@@ -2398,21 +2387,11 @@
               </a:path>
             </a:pathLst>
           </a:custGeom>
-          <a:gradFill flip="none" rotWithShape="1">
-            <a:gsLst>
-              <a:gs pos="38000">
-                <a:schemeClr val="accent1">
-                  <a:lumMod val="5000"/>
-                  <a:lumOff val="95000"/>
-                </a:schemeClr>
-              </a:gs>
-              <a:gs pos="100000">
-                <a:srgbClr val="F4E9FD"/>
-              </a:gs>
-            </a:gsLst>
-            <a:lin ang="2700000" scaled="1"/>
-            <a:tileRect/>
-          </a:gradFill>
+          <a:blipFill dpi="0" rotWithShape="1">
+            <a:blip r:embed="rId4"/>
+            <a:srcRect/>
+            <a:tile tx="0" ty="0" sx="100000" sy="100000" flip="none" algn="tl"/>
+          </a:blipFill>
           <a:ln>
             <a:noFill/>
           </a:ln>
@@ -2560,20 +2539,10 @@
           <a:prstGeom prst="rect">
             <a:avLst/>
           </a:prstGeom>
-          <a:gradFill>
-            <a:gsLst>
-              <a:gs pos="38000">
-                <a:schemeClr val="accent1">
-                  <a:lumMod val="5000"/>
-                  <a:lumOff val="95000"/>
-                </a:schemeClr>
-              </a:gs>
-              <a:gs pos="100000">
-                <a:srgbClr val="F4E9FD"/>
-              </a:gs>
-            </a:gsLst>
-            <a:lin ang="2700000" scaled="1"/>
-          </a:gradFill>
+          <a:blipFill>
+            <a:blip r:embed="rId2"/>
+            <a:tile tx="0" ty="0" sx="100000" sy="100000" flip="none" algn="tl"/>
+          </a:blipFill>
           <a:ln>
             <a:noFill/>
           </a:ln>
@@ -2954,21 +2923,10 @@
               </a:path>
             </a:pathLst>
           </a:custGeom>
-          <a:gradFill flip="none" rotWithShape="1">
-            <a:gsLst>
-              <a:gs pos="38000">
-                <a:schemeClr val="accent1">
-                  <a:lumMod val="5000"/>
-                  <a:lumOff val="95000"/>
-                </a:schemeClr>
-              </a:gs>
-              <a:gs pos="100000">
-                <a:srgbClr val="F4E9FD"/>
-              </a:gs>
-            </a:gsLst>
-            <a:lin ang="2700000" scaled="1"/>
-            <a:tileRect/>
-          </a:gradFill>
+          <a:blipFill>
+            <a:blip r:embed="rId4"/>
+            <a:tile tx="0" ty="0" sx="100000" sy="100000" flip="none" algn="tl"/>
+          </a:blipFill>
           <a:ln>
             <a:noFill/>
           </a:ln>
@@ -3426,21 +3384,10 @@
               </a:path>
             </a:pathLst>
           </a:custGeom>
-          <a:gradFill flip="none" rotWithShape="1">
-            <a:gsLst>
-              <a:gs pos="38000">
-                <a:schemeClr val="accent1">
-                  <a:lumMod val="5000"/>
-                  <a:lumOff val="95000"/>
-                </a:schemeClr>
-              </a:gs>
-              <a:gs pos="100000">
-                <a:srgbClr val="F4E9FD"/>
-              </a:gs>
-            </a:gsLst>
-            <a:lin ang="2700000" scaled="1"/>
-            <a:tileRect/>
-          </a:gradFill>
+          <a:blipFill>
+            <a:blip r:embed="rId4"/>
+            <a:tile tx="0" ty="0" sx="100000" sy="100000" flip="none" algn="tl"/>
+          </a:blipFill>
           <a:ln>
             <a:noFill/>
           </a:ln>
@@ -3766,21 +3713,10 @@
               </a:path>
             </a:pathLst>
           </a:custGeom>
-          <a:gradFill flip="none" rotWithShape="1">
-            <a:gsLst>
-              <a:gs pos="38000">
-                <a:schemeClr val="accent1">
-                  <a:lumMod val="5000"/>
-                  <a:lumOff val="95000"/>
-                </a:schemeClr>
-              </a:gs>
-              <a:gs pos="100000">
-                <a:srgbClr val="F4E9FD"/>
-              </a:gs>
-            </a:gsLst>
-            <a:lin ang="2700000" scaled="1"/>
-            <a:tileRect/>
-          </a:gradFill>
+          <a:blipFill>
+            <a:blip r:embed="rId2"/>
+            <a:tile tx="0" ty="0" sx="100000" sy="100000" flip="none" algn="tl"/>
+          </a:blipFill>
           <a:ln>
             <a:noFill/>
           </a:ln>
@@ -3828,7 +3764,7 @@
           <p:nvPr userDrawn="1"/>
         </p:nvPicPr>
         <p:blipFill>
-          <a:blip r:embed="rId2" cstate="print">
+          <a:blip r:embed="rId3" cstate="print">
             <a:duotone>
               <a:schemeClr val="accent5">
                 <a:shade val="45000"/>
@@ -3865,73 +3801,6 @@
       </p:pic>
       <p:pic>
         <p:nvPicPr>
-          <p:cNvPr id="8" name="Picture 2" descr="Afficher l'image d'origine"/>
-          <p:cNvPicPr>
-            <a:picLocks noChangeAspect="1" noChangeArrowheads="1"/>
-          </p:cNvPicPr>
-          <p:nvPr userDrawn="1"/>
-        </p:nvPicPr>
-        <p:blipFill>
-          <a:blip r:embed="rId3" cstate="print">
-            <a:duotone>
-              <a:schemeClr val="accent1">
-                <a:shade val="45000"/>
-                <a:satMod val="135000"/>
-              </a:schemeClr>
-              <a:prstClr val="white"/>
-            </a:duotone>
-            <a:extLst>
-              <a:ext uri="{BEBA8EAE-BF5A-486C-A8C5-ECC9F3942E4B}">
-                <a14:imgProps xmlns:a14="http://schemas.microsoft.com/office/drawing/2010/main">
-                  <a14:imgLayer r:embed="rId4">
-                    <a14:imgEffect>
-                      <a14:colorTemperature colorTemp="4812"/>
-                    </a14:imgEffect>
-                    <a14:imgEffect>
-                      <a14:brightnessContrast contrast="10000"/>
-                    </a14:imgEffect>
-                  </a14:imgLayer>
-                </a14:imgProps>
-              </a:ext>
-              <a:ext uri="{28A0092B-C50C-407E-A947-70E740481C1C}">
-                <a14:useLocalDpi xmlns:a14="http://schemas.microsoft.com/office/drawing/2010/main" val="0"/>
-              </a:ext>
-            </a:extLst>
-          </a:blip>
-          <a:srcRect/>
-          <a:stretch>
-            <a:fillRect/>
-          </a:stretch>
-        </p:blipFill>
-        <p:spPr bwMode="auto">
-          <a:xfrm>
-            <a:off x="531397" y="2320848"/>
-            <a:ext cx="1077912" cy="1077912"/>
-          </a:xfrm>
-          <a:prstGeom prst="rect">
-            <a:avLst/>
-          </a:prstGeom>
-          <a:noFill/>
-          <a:effectLst>
-            <a:innerShdw blurRad="63500" dist="50800" dir="13500000">
-              <a:prstClr val="black">
-                <a:alpha val="50000"/>
-              </a:prstClr>
-            </a:innerShdw>
-          </a:effectLst>
-          <a:extLst>
-            <a:ext uri="{909E8E84-426E-40DD-AFC4-6F175D3DCCD1}">
-              <a14:hiddenFill xmlns:a14="http://schemas.microsoft.com/office/drawing/2010/main">
-                <a:solidFill>
-                  <a:srgbClr val="FFFFFF"/>
-                </a:solidFill>
-              </a14:hiddenFill>
-            </a:ext>
-          </a:extLst>
-        </p:spPr>
-      </p:pic>
-      <p:pic>
-        <p:nvPicPr>
           <p:cNvPr id="12" name="Image 11"/>
           <p:cNvPicPr>
             <a:picLocks noChangeAspect="1"/>
@@ -3939,7 +3808,7 @@
           <p:nvPr userDrawn="1"/>
         </p:nvPicPr>
         <p:blipFill>
-          <a:blip r:embed="rId5" cstate="print">
+          <a:blip r:embed="rId4" cstate="print">
             <a:duotone>
               <a:schemeClr val="accent5">
                 <a:shade val="45000"/>
@@ -4437,7 +4306,7 @@
         </p:nvSpPr>
         <p:spPr>
           <a:xfrm>
-            <a:off x="1998372" y="3291260"/>
+            <a:off x="1956809" y="2706967"/>
             <a:ext cx="3849977" cy="1569660"/>
           </a:xfrm>
           <a:prstGeom prst="rect">
@@ -4496,7 +4365,7 @@
         </p:nvSpPr>
         <p:spPr>
           <a:xfrm>
-            <a:off x="6507884" y="4637199"/>
+            <a:off x="6433631" y="3588224"/>
             <a:ext cx="4882141" cy="1569660"/>
           </a:xfrm>
           <a:prstGeom prst="rect">
@@ -4555,7 +4424,7 @@
         </p:nvSpPr>
         <p:spPr>
           <a:xfrm>
-            <a:off x="7003759" y="2263511"/>
+            <a:off x="6929506" y="1879087"/>
             <a:ext cx="4386266" cy="984885"/>
           </a:xfrm>
           <a:prstGeom prst="rect">
@@ -4590,23 +4459,6 @@
               </a:rPr>
               <a:t>du projet</a:t>
             </a:r>
-            <a:endParaRPr lang="fr-FR" sz="5800" b="1" dirty="0" smtClean="0">
-              <a:solidFill>
-                <a:schemeClr val="tx1">
-                  <a:lumMod val="75000"/>
-                  <a:lumOff val="25000"/>
-                </a:schemeClr>
-              </a:solidFill>
-              <a:effectLst>
-                <a:outerShdw blurRad="38100" dist="38100" dir="2700000" algn="tl">
-                  <a:srgbClr val="000000">
-                    <a:alpha val="43137"/>
-                  </a:srgbClr>
-                </a:outerShdw>
-              </a:effectLst>
-              <a:latin typeface="Microsoft PhagsPa" panose="020B0502040204020203" pitchFamily="34" charset="0"/>
-              <a:ea typeface="Kozuka Gothic Pro L" panose="020B0200000000000000" pitchFamily="34" charset="-128"/>
-            </a:endParaRPr>
           </a:p>
         </p:txBody>
       </p:sp>
@@ -4656,6 +4508,36 @@
           </a:p>
         </p:txBody>
       </p:sp>
+      <p:pic>
+        <p:nvPicPr>
+          <p:cNvPr id="3" name="Image 2"/>
+          <p:cNvPicPr>
+            <a:picLocks noChangeAspect="1"/>
+          </p:cNvPicPr>
+          <p:nvPr/>
+        </p:nvPicPr>
+        <p:blipFill>
+          <a:blip r:embed="rId3">
+            <a:extLst>
+              <a:ext uri="{28A0092B-C50C-407E-A947-70E740481C1C}">
+                <a14:useLocalDpi xmlns:a14="http://schemas.microsoft.com/office/drawing/2010/main" val="0"/>
+              </a:ext>
+            </a:extLst>
+          </a:blip>
+          <a:stretch>
+            <a:fillRect/>
+          </a:stretch>
+        </p:blipFill>
+        <p:spPr>
+          <a:xfrm>
+            <a:off x="718337" y="4766750"/>
+            <a:ext cx="4823481" cy="1607827"/>
+          </a:xfrm>
+          <a:prstGeom prst="rect">
+            <a:avLst/>
+          </a:prstGeom>
+        </p:spPr>
+      </p:pic>
     </p:spTree>
     <p:extLst>
       <p:ext uri="{BB962C8B-B14F-4D97-AF65-F5344CB8AC3E}">
@@ -4903,6 +4785,41 @@
                                   </p:childTnLst>
                                 </p:cTn>
                               </p:par>
+                              <p:par>
+                                <p:cTn id="23" presetID="22" presetClass="entr" presetSubtype="8" fill="hold" nodeType="withEffect">
+                                  <p:stCondLst>
+                                    <p:cond delay="250"/>
+                                  </p:stCondLst>
+                                  <p:childTnLst>
+                                    <p:set>
+                                      <p:cBhvr>
+                                        <p:cTn id="24" dur="1" fill="hold">
+                                          <p:stCondLst>
+                                            <p:cond delay="0"/>
+                                          </p:stCondLst>
+                                        </p:cTn>
+                                        <p:tgtEl>
+                                          <p:spTgt spid="3"/>
+                                        </p:tgtEl>
+                                        <p:attrNameLst>
+                                          <p:attrName>style.visibility</p:attrName>
+                                        </p:attrNameLst>
+                                      </p:cBhvr>
+                                      <p:to>
+                                        <p:strVal val="visible"/>
+                                      </p:to>
+                                    </p:set>
+                                    <p:animEffect transition="in" filter="wipe(left)">
+                                      <p:cBhvr>
+                                        <p:cTn id="25" dur="500"/>
+                                        <p:tgtEl>
+                                          <p:spTgt spid="3"/>
+                                        </p:tgtEl>
+                                      </p:cBhvr>
+                                    </p:animEffect>
+                                  </p:childTnLst>
+                                </p:cTn>
+                              </p:par>
                             </p:childTnLst>
                           </p:cTn>
                         </p:par>
@@ -4945,6 +4862,15 @@
 <file path=ppt/slides/slide2.xml><?xml version="1.0" encoding="utf-8"?>
 <p:sld xmlns:a="http://schemas.openxmlformats.org/drawingml/2006/main" xmlns:r="http://schemas.openxmlformats.org/officeDocument/2006/relationships" xmlns:p="http://schemas.openxmlformats.org/presentationml/2006/main">
   <p:cSld>
+    <p:bg>
+      <p:bgPr>
+        <a:blipFill>
+          <a:blip r:embed="rId3"/>
+          <a:tile tx="0" ty="0" sx="100000" sy="100000" flip="none" algn="tl"/>
+        </a:blipFill>
+        <a:effectLst/>
+      </p:bgPr>
+    </p:bg>
     <p:spTree>
       <p:nvGrpSpPr>
         <p:cNvPr id="1" name=""/>
@@ -4967,10 +4893,10 @@
         </p:nvGrpSpPr>
         <p:grpSpPr>
           <a:xfrm>
-            <a:off x="910054" y="971939"/>
-            <a:ext cx="2923309" cy="3754806"/>
+            <a:off x="1248903" y="1001220"/>
+            <a:ext cx="2923309" cy="4041835"/>
             <a:chOff x="6129142" y="1000731"/>
-            <a:chExt cx="2923309" cy="3754806"/>
+            <a:chExt cx="2923309" cy="4041835"/>
           </a:xfrm>
           <a:effectLst>
             <a:outerShdw blurRad="50800" dist="38100" dir="2700000" algn="tl" rotWithShape="0">
@@ -5045,13 +4971,13 @@
           <p:spPr>
             <a:xfrm>
               <a:off x="6129142" y="1756244"/>
-              <a:ext cx="2923309" cy="2999293"/>
+              <a:ext cx="2923309" cy="3286322"/>
             </a:xfrm>
             <a:prstGeom prst="rect">
               <a:avLst/>
             </a:prstGeom>
             <a:solidFill>
-              <a:schemeClr val="bg1"/>
+              <a:srgbClr val="FAFAFA"/>
             </a:solidFill>
             <a:ln>
               <a:solidFill>
@@ -5180,7 +5106,7 @@
               <a:avLst/>
             </a:prstGeom>
             <a:solidFill>
-              <a:schemeClr val="bg1"/>
+              <a:srgbClr val="FAFAFA"/>
             </a:solidFill>
             <a:ln>
               <a:solidFill>
@@ -5298,7 +5224,7 @@
           <p:nvPr/>
         </p:nvPicPr>
         <p:blipFill>
-          <a:blip r:embed="rId3" cstate="print">
+          <a:blip r:embed="rId4" cstate="print">
             <a:extLst>
               <a:ext uri="{28A0092B-C50C-407E-A947-70E740481C1C}">
                 <a14:useLocalDpi xmlns:a14="http://schemas.microsoft.com/office/drawing/2010/main" val="0"/>
@@ -5328,7 +5254,7 @@
           <p:nvPr/>
         </p:nvPicPr>
         <p:blipFill rotWithShape="1">
-          <a:blip r:embed="rId4" cstate="print">
+          <a:blip r:embed="rId5" cstate="print">
             <a:extLst>
               <a:ext uri="{28A0092B-C50C-407E-A947-70E740481C1C}">
                 <a14:useLocalDpi xmlns:a14="http://schemas.microsoft.com/office/drawing/2010/main" val="0"/>
@@ -5340,7 +5266,7 @@
         </p:blipFill>
         <p:spPr>
           <a:xfrm>
-            <a:off x="1095758" y="1887555"/>
+            <a:off x="1434607" y="1916836"/>
             <a:ext cx="690840" cy="705084"/>
           </a:xfrm>
           <a:prstGeom prst="rect">
@@ -5356,7 +5282,7 @@
         </p:nvSpPr>
         <p:spPr>
           <a:xfrm>
-            <a:off x="1246292" y="1112311"/>
+            <a:off x="1585141" y="1141592"/>
             <a:ext cx="2250830" cy="461665"/>
           </a:xfrm>
           <a:prstGeom prst="rect">
@@ -5471,7 +5397,7 @@
           <p:nvPr/>
         </p:nvPicPr>
         <p:blipFill rotWithShape="1">
-          <a:blip r:embed="rId5" cstate="print">
+          <a:blip r:embed="rId6" cstate="print">
             <a:extLst>
               <a:ext uri="{28A0092B-C50C-407E-A947-70E740481C1C}">
                 <a14:useLocalDpi xmlns:a14="http://schemas.microsoft.com/office/drawing/2010/main" val="0"/>
@@ -5483,7 +5409,7 @@
         </p:blipFill>
         <p:spPr>
           <a:xfrm>
-            <a:off x="1110587" y="2746115"/>
+            <a:off x="1449436" y="2775396"/>
             <a:ext cx="661181" cy="668215"/>
           </a:xfrm>
           <a:prstGeom prst="rect">
@@ -5499,7 +5425,7 @@
         </p:nvSpPr>
         <p:spPr>
           <a:xfrm>
-            <a:off x="1899139" y="1946155"/>
+            <a:off x="2237988" y="1975436"/>
             <a:ext cx="1821683" cy="400110"/>
           </a:xfrm>
           <a:prstGeom prst="rect">
@@ -5542,7 +5468,7 @@
         </p:nvSpPr>
         <p:spPr>
           <a:xfrm>
-            <a:off x="1891724" y="2859131"/>
+            <a:off x="2230573" y="2888412"/>
             <a:ext cx="1821683" cy="400110"/>
           </a:xfrm>
           <a:prstGeom prst="rect">
@@ -5585,8 +5511,8 @@
         </p:nvSpPr>
         <p:spPr>
           <a:xfrm>
-            <a:off x="1095758" y="3582230"/>
-            <a:ext cx="2490742" cy="861774"/>
+            <a:off x="1434607" y="3611511"/>
+            <a:ext cx="2490742" cy="1323439"/>
           </a:xfrm>
           <a:prstGeom prst="rect">
             <a:avLst/>
@@ -5643,6 +5569,24 @@
               </a:rPr>
               <a:t>Ng-Modals</a:t>
             </a:r>
+            <a:endParaRPr lang="fr-FR" sz="2000" cap="small" dirty="0" smtClean="0">
+              <a:latin typeface="Segoe UI" panose="020B0502040204020203" pitchFamily="34" charset="0"/>
+              <a:cs typeface="Segoe UI" panose="020B0502040204020203" pitchFamily="34" charset="0"/>
+            </a:endParaRPr>
+          </a:p>
+          <a:p>
+            <a:pPr>
+              <a:spcAft>
+                <a:spcPts val="1200"/>
+              </a:spcAft>
+            </a:pPr>
+            <a:r>
+              <a:rPr lang="fr-FR" sz="2000" cap="small" dirty="0" smtClean="0">
+                <a:latin typeface="Segoe UI" panose="020B0502040204020203" pitchFamily="34" charset="0"/>
+                <a:cs typeface="Segoe UI" panose="020B0502040204020203" pitchFamily="34" charset="0"/>
+              </a:rPr>
+              <a:t>material.io</a:t>
+            </a:r>
             <a:endParaRPr lang="fr-FR" sz="2000" cap="small" dirty="0">
               <a:latin typeface="Segoe UI" panose="020B0502040204020203" pitchFamily="34" charset="0"/>
               <a:cs typeface="Segoe UI" panose="020B0502040204020203" pitchFamily="34" charset="0"/>
@@ -5694,8 +5638,8 @@
         </p:nvSpPr>
         <p:spPr>
           <a:xfrm>
-            <a:off x="7582248" y="3319302"/>
-            <a:ext cx="1821683" cy="400110"/>
+            <a:off x="7582249" y="3319302"/>
+            <a:ext cx="1201740" cy="400110"/>
           </a:xfrm>
           <a:prstGeom prst="rect">
             <a:avLst/>
@@ -5732,7 +5676,7 @@
           <p:nvPr/>
         </p:nvPicPr>
         <p:blipFill>
-          <a:blip r:embed="rId6" cstate="print">
+          <a:blip r:embed="rId7" cstate="print">
             <a:extLst>
               <a:ext uri="{28A0092B-C50C-407E-A947-70E740481C1C}">
                 <a14:useLocalDpi xmlns:a14="http://schemas.microsoft.com/office/drawing/2010/main" val="0"/>
@@ -5938,154 +5882,130 @@
           </a:p>
         </p:txBody>
       </p:sp>
-      <p:sp>
-        <p:nvSpPr>
-          <p:cNvPr id="10" name="Rectangle 9"/>
-          <p:cNvSpPr/>
+      <p:grpSp>
+        <p:nvGrpSpPr>
+          <p:cNvPr id="2" name="Groupe 1"/>
+          <p:cNvGrpSpPr/>
           <p:nvPr/>
-        </p:nvSpPr>
-        <p:spPr>
-          <a:xfrm>
-            <a:off x="309489" y="1491175"/>
-            <a:ext cx="2700997" cy="4979963"/>
-          </a:xfrm>
-          <a:prstGeom prst="rect">
-            <a:avLst/>
-          </a:prstGeom>
-          <a:solidFill>
-            <a:schemeClr val="accent6">
-              <a:lumMod val="60000"/>
-              <a:lumOff val="40000"/>
-            </a:schemeClr>
-          </a:solidFill>
-          <a:ln>
-            <a:solidFill>
-              <a:schemeClr val="bg1"/>
-            </a:solidFill>
-          </a:ln>
-        </p:spPr>
-        <p:style>
-          <a:lnRef idx="2">
-            <a:schemeClr val="accent1">
-              <a:shade val="50000"/>
-            </a:schemeClr>
-          </a:lnRef>
-          <a:fillRef idx="1">
-            <a:schemeClr val="accent1"/>
-          </a:fillRef>
-          <a:effectRef idx="0">
-            <a:schemeClr val="accent1"/>
-          </a:effectRef>
-          <a:fontRef idx="minor">
-            <a:schemeClr val="lt1"/>
-          </a:fontRef>
-        </p:style>
-        <p:txBody>
-          <a:bodyPr rtlCol="0" anchor="ctr"/>
-          <a:lstStyle/>
-          <a:p>
-            <a:pPr algn="ctr"/>
-            <a:endParaRPr lang="fr-FR"/>
-          </a:p>
-        </p:txBody>
-      </p:sp>
-      <p:sp>
-        <p:nvSpPr>
-          <p:cNvPr id="17" name="Rectangle 16"/>
-          <p:cNvSpPr/>
-          <p:nvPr/>
-        </p:nvSpPr>
-        <p:spPr>
-          <a:xfrm>
-            <a:off x="4079631" y="1491175"/>
-            <a:ext cx="2827606" cy="4979963"/>
-          </a:xfrm>
-          <a:prstGeom prst="rect">
-            <a:avLst/>
-          </a:prstGeom>
-          <a:solidFill>
-            <a:schemeClr val="accent4">
-              <a:lumMod val="60000"/>
-              <a:lumOff val="40000"/>
-            </a:schemeClr>
-          </a:solidFill>
-          <a:ln>
-            <a:solidFill>
-              <a:schemeClr val="bg1"/>
-            </a:solidFill>
-          </a:ln>
-        </p:spPr>
-        <p:style>
-          <a:lnRef idx="2">
-            <a:schemeClr val="accent1">
-              <a:shade val="50000"/>
-            </a:schemeClr>
-          </a:lnRef>
-          <a:fillRef idx="1">
-            <a:schemeClr val="accent1"/>
-          </a:fillRef>
-          <a:effectRef idx="0">
-            <a:schemeClr val="accent1"/>
-          </a:effectRef>
-          <a:fontRef idx="minor">
-            <a:schemeClr val="lt1"/>
-          </a:fontRef>
-        </p:style>
-        <p:txBody>
-          <a:bodyPr rtlCol="0" anchor="ctr"/>
-          <a:lstStyle/>
-          <a:p>
-            <a:pPr algn="ctr"/>
-            <a:endParaRPr lang="fr-FR"/>
-          </a:p>
-        </p:txBody>
-      </p:sp>
-      <p:sp>
-        <p:nvSpPr>
-          <p:cNvPr id="18" name="Rectangle 17"/>
-          <p:cNvSpPr/>
-          <p:nvPr/>
-        </p:nvSpPr>
-        <p:spPr>
+        </p:nvGrpSpPr>
+        <p:grpSpPr>
           <a:xfrm>
             <a:off x="309489" y="943428"/>
-            <a:ext cx="2700997" cy="547747"/>
+            <a:ext cx="2700997" cy="5527710"/>
+            <a:chOff x="309489" y="943428"/>
+            <a:chExt cx="2700997" cy="5527710"/>
           </a:xfrm>
-          <a:prstGeom prst="rect">
-            <a:avLst/>
-          </a:prstGeom>
-          <a:solidFill>
-            <a:srgbClr val="92D050"/>
-          </a:solidFill>
-          <a:ln>
+        </p:grpSpPr>
+        <p:sp>
+          <p:nvSpPr>
+            <p:cNvPr id="10" name="Rectangle 9"/>
+            <p:cNvSpPr/>
+            <p:nvPr/>
+          </p:nvSpPr>
+          <p:spPr>
+            <a:xfrm>
+              <a:off x="309489" y="1491175"/>
+              <a:ext cx="2700997" cy="4979963"/>
+            </a:xfrm>
+            <a:prstGeom prst="rect">
+              <a:avLst/>
+            </a:prstGeom>
             <a:solidFill>
-              <a:schemeClr val="bg1"/>
+              <a:schemeClr val="accent6">
+                <a:lumMod val="60000"/>
+                <a:lumOff val="40000"/>
+              </a:schemeClr>
             </a:solidFill>
-          </a:ln>
-        </p:spPr>
-        <p:style>
-          <a:lnRef idx="2">
-            <a:schemeClr val="accent1">
-              <a:shade val="50000"/>
-            </a:schemeClr>
-          </a:lnRef>
-          <a:fillRef idx="1">
-            <a:schemeClr val="accent1"/>
-          </a:fillRef>
-          <a:effectRef idx="0">
-            <a:schemeClr val="accent1"/>
-          </a:effectRef>
-          <a:fontRef idx="minor">
-            <a:schemeClr val="lt1"/>
-          </a:fontRef>
-        </p:style>
-        <p:txBody>
-          <a:bodyPr rtlCol="0" anchor="ctr"/>
-          <a:lstStyle/>
-          <a:p>
-            <a:pPr algn="ctr"/>
-            <a:r>
-              <a:rPr lang="fr-FR" sz="2000" b="1" cap="all" dirty="0" smtClean="0">
+            <a:ln>
+              <a:solidFill>
+                <a:schemeClr val="bg1"/>
+              </a:solidFill>
+            </a:ln>
+          </p:spPr>
+          <p:style>
+            <a:lnRef idx="2">
+              <a:schemeClr val="accent1">
+                <a:shade val="50000"/>
+              </a:schemeClr>
+            </a:lnRef>
+            <a:fillRef idx="1">
+              <a:schemeClr val="accent1"/>
+            </a:fillRef>
+            <a:effectRef idx="0">
+              <a:schemeClr val="accent1"/>
+            </a:effectRef>
+            <a:fontRef idx="minor">
+              <a:schemeClr val="lt1"/>
+            </a:fontRef>
+          </p:style>
+          <p:txBody>
+            <a:bodyPr rtlCol="0" anchor="ctr"/>
+            <a:lstStyle/>
+            <a:p>
+              <a:pPr algn="ctr"/>
+              <a:endParaRPr lang="fr-FR"/>
+            </a:p>
+          </p:txBody>
+        </p:sp>
+        <p:sp>
+          <p:nvSpPr>
+            <p:cNvPr id="18" name="Rectangle 17"/>
+            <p:cNvSpPr/>
+            <p:nvPr/>
+          </p:nvSpPr>
+          <p:spPr>
+            <a:xfrm>
+              <a:off x="309489" y="943428"/>
+              <a:ext cx="2700997" cy="547747"/>
+            </a:xfrm>
+            <a:prstGeom prst="rect">
+              <a:avLst/>
+            </a:prstGeom>
+            <a:solidFill>
+              <a:srgbClr val="92D050"/>
+            </a:solidFill>
+            <a:ln>
+              <a:solidFill>
+                <a:schemeClr val="bg1"/>
+              </a:solidFill>
+            </a:ln>
+          </p:spPr>
+          <p:style>
+            <a:lnRef idx="2">
+              <a:schemeClr val="accent1">
+                <a:shade val="50000"/>
+              </a:schemeClr>
+            </a:lnRef>
+            <a:fillRef idx="1">
+              <a:schemeClr val="accent1"/>
+            </a:fillRef>
+            <a:effectRef idx="0">
+              <a:schemeClr val="accent1"/>
+            </a:effectRef>
+            <a:fontRef idx="minor">
+              <a:schemeClr val="lt1"/>
+            </a:fontRef>
+          </p:style>
+          <p:txBody>
+            <a:bodyPr rtlCol="0" anchor="ctr"/>
+            <a:lstStyle/>
+            <a:p>
+              <a:pPr algn="ctr"/>
+              <a:r>
+                <a:rPr lang="fr-FR" sz="2000" b="1" cap="all" dirty="0" smtClean="0">
+                  <a:effectLst>
+                    <a:outerShdw blurRad="38100" dist="38100" dir="2700000" algn="tl">
+                      <a:srgbClr val="000000">
+                        <a:alpha val="43137"/>
+                      </a:srgbClr>
+                    </a:outerShdw>
+                  </a:effectLst>
+                  <a:latin typeface="Segoe UI" panose="020B0502040204020203" pitchFamily="34" charset="0"/>
+                  <a:cs typeface="Segoe UI" panose="020B0502040204020203" pitchFamily="34" charset="0"/>
+                </a:rPr>
+                <a:t>Client</a:t>
+              </a:r>
+              <a:endParaRPr lang="fr-FR" sz="2000" b="1" cap="all" dirty="0">
                 <a:effectLst>
                   <a:outerShdw blurRad="38100" dist="38100" dir="2700000" algn="tl">
                     <a:srgbClr val="000000">
@@ -6095,69 +6015,135 @@
                 </a:effectLst>
                 <a:latin typeface="Segoe UI" panose="020B0502040204020203" pitchFamily="34" charset="0"/>
                 <a:cs typeface="Segoe UI" panose="020B0502040204020203" pitchFamily="34" charset="0"/>
-              </a:rPr>
-              <a:t>Client</a:t>
-            </a:r>
-            <a:endParaRPr lang="fr-FR" sz="2000" b="1" cap="all" dirty="0">
-              <a:effectLst>
-                <a:outerShdw blurRad="38100" dist="38100" dir="2700000" algn="tl">
-                  <a:srgbClr val="000000">
-                    <a:alpha val="43137"/>
-                  </a:srgbClr>
-                </a:outerShdw>
-              </a:effectLst>
-              <a:latin typeface="Segoe UI" panose="020B0502040204020203" pitchFamily="34" charset="0"/>
-              <a:cs typeface="Segoe UI" panose="020B0502040204020203" pitchFamily="34" charset="0"/>
-            </a:endParaRPr>
-          </a:p>
-        </p:txBody>
-      </p:sp>
-      <p:sp>
-        <p:nvSpPr>
-          <p:cNvPr id="19" name="Rectangle 18"/>
-          <p:cNvSpPr/>
+              </a:endParaRPr>
+            </a:p>
+          </p:txBody>
+        </p:sp>
+      </p:grpSp>
+      <p:grpSp>
+        <p:nvGrpSpPr>
+          <p:cNvPr id="4" name="Groupe 3"/>
+          <p:cNvGrpSpPr/>
           <p:nvPr/>
-        </p:nvSpPr>
-        <p:spPr>
+        </p:nvGrpSpPr>
+        <p:grpSpPr>
           <a:xfrm>
             <a:off x="4079631" y="943428"/>
-            <a:ext cx="2827606" cy="547747"/>
+            <a:ext cx="2827606" cy="5527710"/>
+            <a:chOff x="4079631" y="943428"/>
+            <a:chExt cx="2827606" cy="5527710"/>
           </a:xfrm>
-          <a:prstGeom prst="rect">
-            <a:avLst/>
-          </a:prstGeom>
-          <a:solidFill>
-            <a:srgbClr val="FFC000"/>
-          </a:solidFill>
-          <a:ln>
+        </p:grpSpPr>
+        <p:sp>
+          <p:nvSpPr>
+            <p:cNvPr id="17" name="Rectangle 16"/>
+            <p:cNvSpPr/>
+            <p:nvPr/>
+          </p:nvSpPr>
+          <p:spPr>
+            <a:xfrm>
+              <a:off x="4079631" y="1491175"/>
+              <a:ext cx="2827606" cy="4979963"/>
+            </a:xfrm>
+            <a:prstGeom prst="rect">
+              <a:avLst/>
+            </a:prstGeom>
             <a:solidFill>
-              <a:schemeClr val="bg1"/>
+              <a:schemeClr val="accent4">
+                <a:lumMod val="60000"/>
+                <a:lumOff val="40000"/>
+              </a:schemeClr>
             </a:solidFill>
-          </a:ln>
-        </p:spPr>
-        <p:style>
-          <a:lnRef idx="2">
-            <a:schemeClr val="accent1">
-              <a:shade val="50000"/>
-            </a:schemeClr>
-          </a:lnRef>
-          <a:fillRef idx="1">
-            <a:schemeClr val="accent1"/>
-          </a:fillRef>
-          <a:effectRef idx="0">
-            <a:schemeClr val="accent1"/>
-          </a:effectRef>
-          <a:fontRef idx="minor">
-            <a:schemeClr val="lt1"/>
-          </a:fontRef>
-        </p:style>
-        <p:txBody>
-          <a:bodyPr rtlCol="0" anchor="ctr"/>
-          <a:lstStyle/>
-          <a:p>
-            <a:pPr algn="ctr"/>
-            <a:r>
-              <a:rPr lang="fr-FR" sz="2000" b="1" cap="all" dirty="0" smtClean="0">
+            <a:ln>
+              <a:solidFill>
+                <a:schemeClr val="bg1"/>
+              </a:solidFill>
+            </a:ln>
+          </p:spPr>
+          <p:style>
+            <a:lnRef idx="2">
+              <a:schemeClr val="accent1">
+                <a:shade val="50000"/>
+              </a:schemeClr>
+            </a:lnRef>
+            <a:fillRef idx="1">
+              <a:schemeClr val="accent1"/>
+            </a:fillRef>
+            <a:effectRef idx="0">
+              <a:schemeClr val="accent1"/>
+            </a:effectRef>
+            <a:fontRef idx="minor">
+              <a:schemeClr val="lt1"/>
+            </a:fontRef>
+          </p:style>
+          <p:txBody>
+            <a:bodyPr rtlCol="0" anchor="ctr"/>
+            <a:lstStyle/>
+            <a:p>
+              <a:pPr algn="ctr"/>
+              <a:endParaRPr lang="fr-FR"/>
+            </a:p>
+          </p:txBody>
+        </p:sp>
+        <p:sp>
+          <p:nvSpPr>
+            <p:cNvPr id="19" name="Rectangle 18"/>
+            <p:cNvSpPr/>
+            <p:nvPr/>
+          </p:nvSpPr>
+          <p:spPr>
+            <a:xfrm>
+              <a:off x="4079631" y="943428"/>
+              <a:ext cx="2827606" cy="547747"/>
+            </a:xfrm>
+            <a:prstGeom prst="rect">
+              <a:avLst/>
+            </a:prstGeom>
+            <a:solidFill>
+              <a:srgbClr val="FFC000"/>
+            </a:solidFill>
+            <a:ln>
+              <a:solidFill>
+                <a:schemeClr val="bg1"/>
+              </a:solidFill>
+            </a:ln>
+          </p:spPr>
+          <p:style>
+            <a:lnRef idx="2">
+              <a:schemeClr val="accent1">
+                <a:shade val="50000"/>
+              </a:schemeClr>
+            </a:lnRef>
+            <a:fillRef idx="1">
+              <a:schemeClr val="accent1"/>
+            </a:fillRef>
+            <a:effectRef idx="0">
+              <a:schemeClr val="accent1"/>
+            </a:effectRef>
+            <a:fontRef idx="minor">
+              <a:schemeClr val="lt1"/>
+            </a:fontRef>
+          </p:style>
+          <p:txBody>
+            <a:bodyPr rtlCol="0" anchor="ctr"/>
+            <a:lstStyle/>
+            <a:p>
+              <a:pPr algn="ctr"/>
+              <a:r>
+                <a:rPr lang="fr-FR" sz="2000" b="1" cap="all" dirty="0" smtClean="0">
+                  <a:effectLst>
+                    <a:outerShdw blurRad="38100" dist="38100" dir="2700000" algn="tl">
+                      <a:srgbClr val="000000">
+                        <a:alpha val="43137"/>
+                      </a:srgbClr>
+                    </a:outerShdw>
+                  </a:effectLst>
+                  <a:latin typeface="Segoe UI" panose="020B0502040204020203" pitchFamily="34" charset="0"/>
+                  <a:cs typeface="Segoe UI" panose="020B0502040204020203" pitchFamily="34" charset="0"/>
+                </a:rPr>
+                <a:t>Serveur</a:t>
+              </a:r>
+              <a:endParaRPr lang="fr-FR" sz="2000" b="1" cap="all" dirty="0">
                 <a:effectLst>
                   <a:outerShdw blurRad="38100" dist="38100" dir="2700000" algn="tl">
                     <a:srgbClr val="000000">
@@ -6167,23 +6153,11 @@
                 </a:effectLst>
                 <a:latin typeface="Segoe UI" panose="020B0502040204020203" pitchFamily="34" charset="0"/>
                 <a:cs typeface="Segoe UI" panose="020B0502040204020203" pitchFamily="34" charset="0"/>
-              </a:rPr>
-              <a:t>Serveur</a:t>
-            </a:r>
-            <a:endParaRPr lang="fr-FR" sz="2000" b="1" cap="all" dirty="0">
-              <a:effectLst>
-                <a:outerShdw blurRad="38100" dist="38100" dir="2700000" algn="tl">
-                  <a:srgbClr val="000000">
-                    <a:alpha val="43137"/>
-                  </a:srgbClr>
-                </a:outerShdw>
-              </a:effectLst>
-              <a:latin typeface="Segoe UI" panose="020B0502040204020203" pitchFamily="34" charset="0"/>
-              <a:cs typeface="Segoe UI" panose="020B0502040204020203" pitchFamily="34" charset="0"/>
-            </a:endParaRPr>
-          </a:p>
-        </p:txBody>
-      </p:sp>
+              </a:endParaRPr>
+            </a:p>
+          </p:txBody>
+        </p:sp>
+      </p:grpSp>
       <p:sp>
         <p:nvSpPr>
           <p:cNvPr id="15" name="Flèche droite 14"/>
@@ -6669,18 +6643,18 @@
               <a:buChar char="•"/>
             </a:pPr>
             <a:r>
-              <a:rPr lang="fr-FR" dirty="0" err="1" smtClean="0">
+              <a:rPr lang="fr-FR" dirty="0" smtClean="0">
                 <a:latin typeface="Segoe UI" panose="020B0502040204020203" pitchFamily="34" charset="0"/>
                 <a:cs typeface="Segoe UI" panose="020B0502040204020203" pitchFamily="34" charset="0"/>
               </a:rPr>
-              <a:t>Merge</a:t>
+              <a:t>Fusion </a:t>
             </a:r>
             <a:r>
               <a:rPr lang="fr-FR" dirty="0" smtClean="0">
                 <a:latin typeface="Segoe UI" panose="020B0502040204020203" pitchFamily="34" charset="0"/>
                 <a:cs typeface="Segoe UI" panose="020B0502040204020203" pitchFamily="34" charset="0"/>
               </a:rPr>
-              <a:t> des fichiers</a:t>
+              <a:t>des fichiers</a:t>
             </a:r>
           </a:p>
         </p:txBody>
@@ -7029,9 +7003,1005 @@
   <p:timing>
     <p:tnLst>
       <p:par>
-        <p:cTn id="1" dur="indefinite" restart="never" nodeType="tmRoot"/>
+        <p:cTn id="1" dur="indefinite" restart="never" nodeType="tmRoot">
+          <p:childTnLst>
+            <p:seq concurrent="1" nextAc="seek">
+              <p:cTn id="2" dur="indefinite" nodeType="mainSeq">
+                <p:childTnLst>
+                  <p:par>
+                    <p:cTn id="3" fill="hold">
+                      <p:stCondLst>
+                        <p:cond delay="indefinite"/>
+                        <p:cond evt="onBegin" delay="0">
+                          <p:tn val="2"/>
+                        </p:cond>
+                      </p:stCondLst>
+                      <p:childTnLst>
+                        <p:par>
+                          <p:cTn id="4" fill="hold">
+                            <p:stCondLst>
+                              <p:cond delay="0"/>
+                            </p:stCondLst>
+                            <p:childTnLst>
+                              <p:par>
+                                <p:cTn id="5" presetID="10" presetClass="entr" presetSubtype="0" fill="hold" nodeType="withEffect">
+                                  <p:stCondLst>
+                                    <p:cond delay="0"/>
+                                  </p:stCondLst>
+                                  <p:childTnLst>
+                                    <p:set>
+                                      <p:cBhvr>
+                                        <p:cTn id="6" dur="1" fill="hold">
+                                          <p:stCondLst>
+                                            <p:cond delay="0"/>
+                                          </p:stCondLst>
+                                        </p:cTn>
+                                        <p:tgtEl>
+                                          <p:spTgt spid="23"/>
+                                        </p:tgtEl>
+                                        <p:attrNameLst>
+                                          <p:attrName>style.visibility</p:attrName>
+                                        </p:attrNameLst>
+                                      </p:cBhvr>
+                                      <p:to>
+                                        <p:strVal val="visible"/>
+                                      </p:to>
+                                    </p:set>
+                                    <p:animEffect transition="in" filter="fade">
+                                      <p:cBhvr>
+                                        <p:cTn id="7" dur="500"/>
+                                        <p:tgtEl>
+                                          <p:spTgt spid="23"/>
+                                        </p:tgtEl>
+                                      </p:cBhvr>
+                                    </p:animEffect>
+                                  </p:childTnLst>
+                                </p:cTn>
+                              </p:par>
+                              <p:par>
+                                <p:cTn id="8" presetID="10" presetClass="entr" presetSubtype="0" fill="hold" grpId="0" nodeType="withEffect">
+                                  <p:stCondLst>
+                                    <p:cond delay="0"/>
+                                  </p:stCondLst>
+                                  <p:childTnLst>
+                                    <p:set>
+                                      <p:cBhvr>
+                                        <p:cTn id="9" dur="1" fill="hold">
+                                          <p:stCondLst>
+                                            <p:cond delay="0"/>
+                                          </p:stCondLst>
+                                        </p:cTn>
+                                        <p:tgtEl>
+                                          <p:spTgt spid="25"/>
+                                        </p:tgtEl>
+                                        <p:attrNameLst>
+                                          <p:attrName>style.visibility</p:attrName>
+                                        </p:attrNameLst>
+                                      </p:cBhvr>
+                                      <p:to>
+                                        <p:strVal val="visible"/>
+                                      </p:to>
+                                    </p:set>
+                                    <p:animEffect transition="in" filter="fade">
+                                      <p:cBhvr>
+                                        <p:cTn id="10" dur="500"/>
+                                        <p:tgtEl>
+                                          <p:spTgt spid="25"/>
+                                        </p:tgtEl>
+                                      </p:cBhvr>
+                                    </p:animEffect>
+                                  </p:childTnLst>
+                                </p:cTn>
+                              </p:par>
+                            </p:childTnLst>
+                          </p:cTn>
+                        </p:par>
+                        <p:par>
+                          <p:cTn id="11" fill="hold">
+                            <p:stCondLst>
+                              <p:cond delay="500"/>
+                            </p:stCondLst>
+                            <p:childTnLst>
+                              <p:par>
+                                <p:cTn id="12" presetID="10" presetClass="entr" presetSubtype="0" fill="hold" grpId="0" nodeType="afterEffect">
+                                  <p:stCondLst>
+                                    <p:cond delay="0"/>
+                                  </p:stCondLst>
+                                  <p:childTnLst>
+                                    <p:set>
+                                      <p:cBhvr>
+                                        <p:cTn id="13" dur="1" fill="hold">
+                                          <p:stCondLst>
+                                            <p:cond delay="0"/>
+                                          </p:stCondLst>
+                                        </p:cTn>
+                                        <p:tgtEl>
+                                          <p:spTgt spid="34">
+                                            <p:txEl>
+                                              <p:pRg st="0" end="0"/>
+                                            </p:txEl>
+                                          </p:spTgt>
+                                        </p:tgtEl>
+                                        <p:attrNameLst>
+                                          <p:attrName>style.visibility</p:attrName>
+                                        </p:attrNameLst>
+                                      </p:cBhvr>
+                                      <p:to>
+                                        <p:strVal val="visible"/>
+                                      </p:to>
+                                    </p:set>
+                                    <p:animEffect transition="in" filter="fade">
+                                      <p:cBhvr>
+                                        <p:cTn id="14" dur="500"/>
+                                        <p:tgtEl>
+                                          <p:spTgt spid="34">
+                                            <p:txEl>
+                                              <p:pRg st="0" end="0"/>
+                                            </p:txEl>
+                                          </p:spTgt>
+                                        </p:tgtEl>
+                                      </p:cBhvr>
+                                    </p:animEffect>
+                                  </p:childTnLst>
+                                </p:cTn>
+                              </p:par>
+                            </p:childTnLst>
+                          </p:cTn>
+                        </p:par>
+                        <p:par>
+                          <p:cTn id="15" fill="hold">
+                            <p:stCondLst>
+                              <p:cond delay="1000"/>
+                            </p:stCondLst>
+                            <p:childTnLst>
+                              <p:par>
+                                <p:cTn id="16" presetID="10" presetClass="entr" presetSubtype="0" fill="hold" grpId="0" nodeType="afterEffect">
+                                  <p:stCondLst>
+                                    <p:cond delay="0"/>
+                                  </p:stCondLst>
+                                  <p:childTnLst>
+                                    <p:set>
+                                      <p:cBhvr>
+                                        <p:cTn id="17" dur="1" fill="hold">
+                                          <p:stCondLst>
+                                            <p:cond delay="0"/>
+                                          </p:stCondLst>
+                                        </p:cTn>
+                                        <p:tgtEl>
+                                          <p:spTgt spid="34">
+                                            <p:txEl>
+                                              <p:pRg st="1" end="1"/>
+                                            </p:txEl>
+                                          </p:spTgt>
+                                        </p:tgtEl>
+                                        <p:attrNameLst>
+                                          <p:attrName>style.visibility</p:attrName>
+                                        </p:attrNameLst>
+                                      </p:cBhvr>
+                                      <p:to>
+                                        <p:strVal val="visible"/>
+                                      </p:to>
+                                    </p:set>
+                                    <p:animEffect transition="in" filter="fade">
+                                      <p:cBhvr>
+                                        <p:cTn id="18" dur="500"/>
+                                        <p:tgtEl>
+                                          <p:spTgt spid="34">
+                                            <p:txEl>
+                                              <p:pRg st="1" end="1"/>
+                                            </p:txEl>
+                                          </p:spTgt>
+                                        </p:tgtEl>
+                                      </p:cBhvr>
+                                    </p:animEffect>
+                                  </p:childTnLst>
+                                </p:cTn>
+                              </p:par>
+                            </p:childTnLst>
+                          </p:cTn>
+                        </p:par>
+                      </p:childTnLst>
+                    </p:cTn>
+                  </p:par>
+                  <p:par>
+                    <p:cTn id="19" fill="hold">
+                      <p:stCondLst>
+                        <p:cond delay="indefinite"/>
+                      </p:stCondLst>
+                      <p:childTnLst>
+                        <p:par>
+                          <p:cTn id="20" fill="hold">
+                            <p:stCondLst>
+                              <p:cond delay="0"/>
+                            </p:stCondLst>
+                            <p:childTnLst>
+                              <p:par>
+                                <p:cTn id="21" presetID="22" presetClass="entr" presetSubtype="1" fill="hold" nodeType="clickEffect">
+                                  <p:stCondLst>
+                                    <p:cond delay="0"/>
+                                  </p:stCondLst>
+                                  <p:childTnLst>
+                                    <p:set>
+                                      <p:cBhvr>
+                                        <p:cTn id="22" dur="1" fill="hold">
+                                          <p:stCondLst>
+                                            <p:cond delay="0"/>
+                                          </p:stCondLst>
+                                        </p:cTn>
+                                        <p:tgtEl>
+                                          <p:spTgt spid="4"/>
+                                        </p:tgtEl>
+                                        <p:attrNameLst>
+                                          <p:attrName>style.visibility</p:attrName>
+                                        </p:attrNameLst>
+                                      </p:cBhvr>
+                                      <p:to>
+                                        <p:strVal val="visible"/>
+                                      </p:to>
+                                    </p:set>
+                                    <p:animEffect transition="in" filter="wipe(up)">
+                                      <p:cBhvr>
+                                        <p:cTn id="23" dur="500"/>
+                                        <p:tgtEl>
+                                          <p:spTgt spid="4"/>
+                                        </p:tgtEl>
+                                      </p:cBhvr>
+                                    </p:animEffect>
+                                  </p:childTnLst>
+                                </p:cTn>
+                              </p:par>
+                            </p:childTnLst>
+                          </p:cTn>
+                        </p:par>
+                        <p:par>
+                          <p:cTn id="24" fill="hold">
+                            <p:stCondLst>
+                              <p:cond delay="500"/>
+                            </p:stCondLst>
+                            <p:childTnLst>
+                              <p:par>
+                                <p:cTn id="25" presetID="10" presetClass="entr" presetSubtype="0" fill="hold" grpId="0" nodeType="afterEffect">
+                                  <p:stCondLst>
+                                    <p:cond delay="0"/>
+                                  </p:stCondLst>
+                                  <p:childTnLst>
+                                    <p:set>
+                                      <p:cBhvr>
+                                        <p:cTn id="26" dur="1" fill="hold">
+                                          <p:stCondLst>
+                                            <p:cond delay="0"/>
+                                          </p:stCondLst>
+                                        </p:cTn>
+                                        <p:tgtEl>
+                                          <p:spTgt spid="33">
+                                            <p:txEl>
+                                              <p:pRg st="0" end="0"/>
+                                            </p:txEl>
+                                          </p:spTgt>
+                                        </p:tgtEl>
+                                        <p:attrNameLst>
+                                          <p:attrName>style.visibility</p:attrName>
+                                        </p:attrNameLst>
+                                      </p:cBhvr>
+                                      <p:to>
+                                        <p:strVal val="visible"/>
+                                      </p:to>
+                                    </p:set>
+                                    <p:animEffect transition="in" filter="fade">
+                                      <p:cBhvr>
+                                        <p:cTn id="27" dur="500"/>
+                                        <p:tgtEl>
+                                          <p:spTgt spid="33">
+                                            <p:txEl>
+                                              <p:pRg st="0" end="0"/>
+                                            </p:txEl>
+                                          </p:spTgt>
+                                        </p:tgtEl>
+                                      </p:cBhvr>
+                                    </p:animEffect>
+                                  </p:childTnLst>
+                                </p:cTn>
+                              </p:par>
+                            </p:childTnLst>
+                          </p:cTn>
+                        </p:par>
+                        <p:par>
+                          <p:cTn id="28" fill="hold">
+                            <p:stCondLst>
+                              <p:cond delay="1000"/>
+                            </p:stCondLst>
+                            <p:childTnLst>
+                              <p:par>
+                                <p:cTn id="29" presetID="10" presetClass="entr" presetSubtype="0" fill="hold" grpId="0" nodeType="afterEffect">
+                                  <p:stCondLst>
+                                    <p:cond delay="0"/>
+                                  </p:stCondLst>
+                                  <p:childTnLst>
+                                    <p:set>
+                                      <p:cBhvr>
+                                        <p:cTn id="30" dur="1" fill="hold">
+                                          <p:stCondLst>
+                                            <p:cond delay="0"/>
+                                          </p:stCondLst>
+                                        </p:cTn>
+                                        <p:tgtEl>
+                                          <p:spTgt spid="33">
+                                            <p:txEl>
+                                              <p:pRg st="1" end="1"/>
+                                            </p:txEl>
+                                          </p:spTgt>
+                                        </p:tgtEl>
+                                        <p:attrNameLst>
+                                          <p:attrName>style.visibility</p:attrName>
+                                        </p:attrNameLst>
+                                      </p:cBhvr>
+                                      <p:to>
+                                        <p:strVal val="visible"/>
+                                      </p:to>
+                                    </p:set>
+                                    <p:animEffect transition="in" filter="fade">
+                                      <p:cBhvr>
+                                        <p:cTn id="31" dur="500"/>
+                                        <p:tgtEl>
+                                          <p:spTgt spid="33">
+                                            <p:txEl>
+                                              <p:pRg st="1" end="1"/>
+                                            </p:txEl>
+                                          </p:spTgt>
+                                        </p:tgtEl>
+                                      </p:cBhvr>
+                                    </p:animEffect>
+                                  </p:childTnLst>
+                                </p:cTn>
+                              </p:par>
+                            </p:childTnLst>
+                          </p:cTn>
+                        </p:par>
+                        <p:par>
+                          <p:cTn id="32" fill="hold">
+                            <p:stCondLst>
+                              <p:cond delay="1500"/>
+                            </p:stCondLst>
+                            <p:childTnLst>
+                              <p:par>
+                                <p:cTn id="33" presetID="10" presetClass="entr" presetSubtype="0" fill="hold" grpId="0" nodeType="afterEffect">
+                                  <p:stCondLst>
+                                    <p:cond delay="0"/>
+                                  </p:stCondLst>
+                                  <p:childTnLst>
+                                    <p:set>
+                                      <p:cBhvr>
+                                        <p:cTn id="34" dur="1" fill="hold">
+                                          <p:stCondLst>
+                                            <p:cond delay="0"/>
+                                          </p:stCondLst>
+                                        </p:cTn>
+                                        <p:tgtEl>
+                                          <p:spTgt spid="33">
+                                            <p:txEl>
+                                              <p:pRg st="2" end="2"/>
+                                            </p:txEl>
+                                          </p:spTgt>
+                                        </p:tgtEl>
+                                        <p:attrNameLst>
+                                          <p:attrName>style.visibility</p:attrName>
+                                        </p:attrNameLst>
+                                      </p:cBhvr>
+                                      <p:to>
+                                        <p:strVal val="visible"/>
+                                      </p:to>
+                                    </p:set>
+                                    <p:animEffect transition="in" filter="fade">
+                                      <p:cBhvr>
+                                        <p:cTn id="35" dur="500"/>
+                                        <p:tgtEl>
+                                          <p:spTgt spid="33">
+                                            <p:txEl>
+                                              <p:pRg st="2" end="2"/>
+                                            </p:txEl>
+                                          </p:spTgt>
+                                        </p:tgtEl>
+                                      </p:cBhvr>
+                                    </p:animEffect>
+                                  </p:childTnLst>
+                                </p:cTn>
+                              </p:par>
+                            </p:childTnLst>
+                          </p:cTn>
+                        </p:par>
+                        <p:par>
+                          <p:cTn id="36" fill="hold">
+                            <p:stCondLst>
+                              <p:cond delay="2000"/>
+                            </p:stCondLst>
+                            <p:childTnLst>
+                              <p:par>
+                                <p:cTn id="37" presetID="10" presetClass="entr" presetSubtype="0" fill="hold" nodeType="afterEffect">
+                                  <p:stCondLst>
+                                    <p:cond delay="0"/>
+                                  </p:stCondLst>
+                                  <p:childTnLst>
+                                    <p:set>
+                                      <p:cBhvr>
+                                        <p:cTn id="38" dur="1" fill="hold">
+                                          <p:stCondLst>
+                                            <p:cond delay="0"/>
+                                          </p:stCondLst>
+                                        </p:cTn>
+                                        <p:tgtEl>
+                                          <p:spTgt spid="35"/>
+                                        </p:tgtEl>
+                                        <p:attrNameLst>
+                                          <p:attrName>style.visibility</p:attrName>
+                                        </p:attrNameLst>
+                                      </p:cBhvr>
+                                      <p:to>
+                                        <p:strVal val="visible"/>
+                                      </p:to>
+                                    </p:set>
+                                    <p:animEffect transition="in" filter="fade">
+                                      <p:cBhvr>
+                                        <p:cTn id="39" dur="500"/>
+                                        <p:tgtEl>
+                                          <p:spTgt spid="35"/>
+                                        </p:tgtEl>
+                                      </p:cBhvr>
+                                    </p:animEffect>
+                                  </p:childTnLst>
+                                </p:cTn>
+                              </p:par>
+                              <p:par>
+                                <p:cTn id="40" presetID="10" presetClass="entr" presetSubtype="0" fill="hold" grpId="0" nodeType="withEffect">
+                                  <p:stCondLst>
+                                    <p:cond delay="0"/>
+                                  </p:stCondLst>
+                                  <p:childTnLst>
+                                    <p:set>
+                                      <p:cBhvr>
+                                        <p:cTn id="41" dur="1" fill="hold">
+                                          <p:stCondLst>
+                                            <p:cond delay="0"/>
+                                          </p:stCondLst>
+                                        </p:cTn>
+                                        <p:tgtEl>
+                                          <p:spTgt spid="36"/>
+                                        </p:tgtEl>
+                                        <p:attrNameLst>
+                                          <p:attrName>style.visibility</p:attrName>
+                                        </p:attrNameLst>
+                                      </p:cBhvr>
+                                      <p:to>
+                                        <p:strVal val="visible"/>
+                                      </p:to>
+                                    </p:set>
+                                    <p:animEffect transition="in" filter="fade">
+                                      <p:cBhvr>
+                                        <p:cTn id="42" dur="500"/>
+                                        <p:tgtEl>
+                                          <p:spTgt spid="36"/>
+                                        </p:tgtEl>
+                                      </p:cBhvr>
+                                    </p:animEffect>
+                                  </p:childTnLst>
+                                </p:cTn>
+                              </p:par>
+                            </p:childTnLst>
+                          </p:cTn>
+                        </p:par>
+                        <p:par>
+                          <p:cTn id="43" fill="hold">
+                            <p:stCondLst>
+                              <p:cond delay="2500"/>
+                            </p:stCondLst>
+                            <p:childTnLst>
+                              <p:par>
+                                <p:cTn id="44" presetID="16" presetClass="entr" presetSubtype="37" fill="hold" nodeType="afterEffect">
+                                  <p:stCondLst>
+                                    <p:cond delay="0"/>
+                                  </p:stCondLst>
+                                  <p:childTnLst>
+                                    <p:set>
+                                      <p:cBhvr>
+                                        <p:cTn id="45" dur="1" fill="hold">
+                                          <p:stCondLst>
+                                            <p:cond delay="0"/>
+                                          </p:stCondLst>
+                                        </p:cTn>
+                                        <p:tgtEl>
+                                          <p:spTgt spid="39"/>
+                                        </p:tgtEl>
+                                        <p:attrNameLst>
+                                          <p:attrName>style.visibility</p:attrName>
+                                        </p:attrNameLst>
+                                      </p:cBhvr>
+                                      <p:to>
+                                        <p:strVal val="visible"/>
+                                      </p:to>
+                                    </p:set>
+                                    <p:animEffect transition="in" filter="barn(outVertical)">
+                                      <p:cBhvr>
+                                        <p:cTn id="46" dur="500"/>
+                                        <p:tgtEl>
+                                          <p:spTgt spid="39"/>
+                                        </p:tgtEl>
+                                      </p:cBhvr>
+                                    </p:animEffect>
+                                  </p:childTnLst>
+                                </p:cTn>
+                              </p:par>
+                            </p:childTnLst>
+                          </p:cTn>
+                        </p:par>
+                        <p:par>
+                          <p:cTn id="47" fill="hold">
+                            <p:stCondLst>
+                              <p:cond delay="3000"/>
+                            </p:stCondLst>
+                            <p:childTnLst>
+                              <p:par>
+                                <p:cTn id="48" presetID="10" presetClass="entr" presetSubtype="0" fill="hold" grpId="0" nodeType="afterEffect">
+                                  <p:stCondLst>
+                                    <p:cond delay="0"/>
+                                  </p:stCondLst>
+                                  <p:childTnLst>
+                                    <p:set>
+                                      <p:cBhvr>
+                                        <p:cTn id="49" dur="1" fill="hold">
+                                          <p:stCondLst>
+                                            <p:cond delay="0"/>
+                                          </p:stCondLst>
+                                        </p:cTn>
+                                        <p:tgtEl>
+                                          <p:spTgt spid="40"/>
+                                        </p:tgtEl>
+                                        <p:attrNameLst>
+                                          <p:attrName>style.visibility</p:attrName>
+                                        </p:attrNameLst>
+                                      </p:cBhvr>
+                                      <p:to>
+                                        <p:strVal val="visible"/>
+                                      </p:to>
+                                    </p:set>
+                                    <p:animEffect transition="in" filter="fade">
+                                      <p:cBhvr>
+                                        <p:cTn id="50" dur="500"/>
+                                        <p:tgtEl>
+                                          <p:spTgt spid="40"/>
+                                        </p:tgtEl>
+                                      </p:cBhvr>
+                                    </p:animEffect>
+                                  </p:childTnLst>
+                                </p:cTn>
+                              </p:par>
+                            </p:childTnLst>
+                          </p:cTn>
+                        </p:par>
+                        <p:par>
+                          <p:cTn id="51" fill="hold">
+                            <p:stCondLst>
+                              <p:cond delay="3500"/>
+                            </p:stCondLst>
+                            <p:childTnLst>
+                              <p:par>
+                                <p:cTn id="52" presetID="10" presetClass="entr" presetSubtype="0" fill="hold" grpId="0" nodeType="afterEffect">
+                                  <p:stCondLst>
+                                    <p:cond delay="0"/>
+                                  </p:stCondLst>
+                                  <p:childTnLst>
+                                    <p:set>
+                                      <p:cBhvr>
+                                        <p:cTn id="53" dur="1" fill="hold">
+                                          <p:stCondLst>
+                                            <p:cond delay="0"/>
+                                          </p:stCondLst>
+                                        </p:cTn>
+                                        <p:tgtEl>
+                                          <p:spTgt spid="15"/>
+                                        </p:tgtEl>
+                                        <p:attrNameLst>
+                                          <p:attrName>style.visibility</p:attrName>
+                                        </p:attrNameLst>
+                                      </p:cBhvr>
+                                      <p:to>
+                                        <p:strVal val="visible"/>
+                                      </p:to>
+                                    </p:set>
+                                    <p:animEffect transition="in" filter="fade">
+                                      <p:cBhvr>
+                                        <p:cTn id="54" dur="500"/>
+                                        <p:tgtEl>
+                                          <p:spTgt spid="15"/>
+                                        </p:tgtEl>
+                                      </p:cBhvr>
+                                    </p:animEffect>
+                                  </p:childTnLst>
+                                </p:cTn>
+                              </p:par>
+                              <p:par>
+                                <p:cTn id="55" presetID="10" presetClass="entr" presetSubtype="0" fill="hold" grpId="0" nodeType="withEffect">
+                                  <p:stCondLst>
+                                    <p:cond delay="0"/>
+                                  </p:stCondLst>
+                                  <p:childTnLst>
+                                    <p:set>
+                                      <p:cBhvr>
+                                        <p:cTn id="56" dur="1" fill="hold">
+                                          <p:stCondLst>
+                                            <p:cond delay="0"/>
+                                          </p:stCondLst>
+                                        </p:cTn>
+                                        <p:tgtEl>
+                                          <p:spTgt spid="27"/>
+                                        </p:tgtEl>
+                                        <p:attrNameLst>
+                                          <p:attrName>style.visibility</p:attrName>
+                                        </p:attrNameLst>
+                                      </p:cBhvr>
+                                      <p:to>
+                                        <p:strVal val="visible"/>
+                                      </p:to>
+                                    </p:set>
+                                    <p:animEffect transition="in" filter="fade">
+                                      <p:cBhvr>
+                                        <p:cTn id="57" dur="500"/>
+                                        <p:tgtEl>
+                                          <p:spTgt spid="27"/>
+                                        </p:tgtEl>
+                                      </p:cBhvr>
+                                    </p:animEffect>
+                                  </p:childTnLst>
+                                </p:cTn>
+                              </p:par>
+                              <p:par>
+                                <p:cTn id="58" presetID="10" presetClass="entr" presetSubtype="0" fill="hold" grpId="0" nodeType="withEffect">
+                                  <p:stCondLst>
+                                    <p:cond delay="0"/>
+                                  </p:stCondLst>
+                                  <p:childTnLst>
+                                    <p:set>
+                                      <p:cBhvr>
+                                        <p:cTn id="59" dur="1" fill="hold">
+                                          <p:stCondLst>
+                                            <p:cond delay="0"/>
+                                          </p:stCondLst>
+                                        </p:cTn>
+                                        <p:tgtEl>
+                                          <p:spTgt spid="26"/>
+                                        </p:tgtEl>
+                                        <p:attrNameLst>
+                                          <p:attrName>style.visibility</p:attrName>
+                                        </p:attrNameLst>
+                                      </p:cBhvr>
+                                      <p:to>
+                                        <p:strVal val="visible"/>
+                                      </p:to>
+                                    </p:set>
+                                    <p:animEffect transition="in" filter="fade">
+                                      <p:cBhvr>
+                                        <p:cTn id="60" dur="500"/>
+                                        <p:tgtEl>
+                                          <p:spTgt spid="26"/>
+                                        </p:tgtEl>
+                                      </p:cBhvr>
+                                    </p:animEffect>
+                                  </p:childTnLst>
+                                </p:cTn>
+                              </p:par>
+                            </p:childTnLst>
+                          </p:cTn>
+                        </p:par>
+                        <p:par>
+                          <p:cTn id="61" fill="hold">
+                            <p:stCondLst>
+                              <p:cond delay="4000"/>
+                            </p:stCondLst>
+                            <p:childTnLst>
+                              <p:par>
+                                <p:cTn id="62" presetID="10" presetClass="entr" presetSubtype="0" fill="hold" grpId="0" nodeType="afterEffect">
+                                  <p:stCondLst>
+                                    <p:cond delay="0"/>
+                                  </p:stCondLst>
+                                  <p:childTnLst>
+                                    <p:set>
+                                      <p:cBhvr>
+                                        <p:cTn id="63" dur="1" fill="hold">
+                                          <p:stCondLst>
+                                            <p:cond delay="0"/>
+                                          </p:stCondLst>
+                                        </p:cTn>
+                                        <p:tgtEl>
+                                          <p:spTgt spid="28"/>
+                                        </p:tgtEl>
+                                        <p:attrNameLst>
+                                          <p:attrName>style.visibility</p:attrName>
+                                        </p:attrNameLst>
+                                      </p:cBhvr>
+                                      <p:to>
+                                        <p:strVal val="visible"/>
+                                      </p:to>
+                                    </p:set>
+                                    <p:animEffect transition="in" filter="fade">
+                                      <p:cBhvr>
+                                        <p:cTn id="64" dur="500"/>
+                                        <p:tgtEl>
+                                          <p:spTgt spid="28"/>
+                                        </p:tgtEl>
+                                      </p:cBhvr>
+                                    </p:animEffect>
+                                  </p:childTnLst>
+                                </p:cTn>
+                              </p:par>
+                              <p:par>
+                                <p:cTn id="65" presetID="10" presetClass="entr" presetSubtype="0" fill="hold" grpId="0" nodeType="withEffect">
+                                  <p:stCondLst>
+                                    <p:cond delay="0"/>
+                                  </p:stCondLst>
+                                  <p:childTnLst>
+                                    <p:set>
+                                      <p:cBhvr>
+                                        <p:cTn id="66" dur="1" fill="hold">
+                                          <p:stCondLst>
+                                            <p:cond delay="0"/>
+                                          </p:stCondLst>
+                                        </p:cTn>
+                                        <p:tgtEl>
+                                          <p:spTgt spid="20"/>
+                                        </p:tgtEl>
+                                        <p:attrNameLst>
+                                          <p:attrName>style.visibility</p:attrName>
+                                        </p:attrNameLst>
+                                      </p:cBhvr>
+                                      <p:to>
+                                        <p:strVal val="visible"/>
+                                      </p:to>
+                                    </p:set>
+                                    <p:animEffect transition="in" filter="fade">
+                                      <p:cBhvr>
+                                        <p:cTn id="67" dur="500"/>
+                                        <p:tgtEl>
+                                          <p:spTgt spid="20"/>
+                                        </p:tgtEl>
+                                      </p:cBhvr>
+                                    </p:animEffect>
+                                  </p:childTnLst>
+                                </p:cTn>
+                              </p:par>
+                              <p:par>
+                                <p:cTn id="68" presetID="10" presetClass="entr" presetSubtype="0" fill="hold" grpId="0" nodeType="withEffect">
+                                  <p:stCondLst>
+                                    <p:cond delay="0"/>
+                                  </p:stCondLst>
+                                  <p:childTnLst>
+                                    <p:set>
+                                      <p:cBhvr>
+                                        <p:cTn id="69" dur="1" fill="hold">
+                                          <p:stCondLst>
+                                            <p:cond delay="0"/>
+                                          </p:stCondLst>
+                                        </p:cTn>
+                                        <p:tgtEl>
+                                          <p:spTgt spid="29"/>
+                                        </p:tgtEl>
+                                        <p:attrNameLst>
+                                          <p:attrName>style.visibility</p:attrName>
+                                        </p:attrNameLst>
+                                      </p:cBhvr>
+                                      <p:to>
+                                        <p:strVal val="visible"/>
+                                      </p:to>
+                                    </p:set>
+                                    <p:animEffect transition="in" filter="fade">
+                                      <p:cBhvr>
+                                        <p:cTn id="70" dur="500"/>
+                                        <p:tgtEl>
+                                          <p:spTgt spid="29"/>
+                                        </p:tgtEl>
+                                      </p:cBhvr>
+                                    </p:animEffect>
+                                  </p:childTnLst>
+                                </p:cTn>
+                              </p:par>
+                            </p:childTnLst>
+                          </p:cTn>
+                        </p:par>
+                        <p:par>
+                          <p:cTn id="71" fill="hold">
+                            <p:stCondLst>
+                              <p:cond delay="4500"/>
+                            </p:stCondLst>
+                            <p:childTnLst>
+                              <p:par>
+                                <p:cTn id="72" presetID="10" presetClass="entr" presetSubtype="0" fill="hold" grpId="0" nodeType="afterEffect">
+                                  <p:stCondLst>
+                                    <p:cond delay="0"/>
+                                  </p:stCondLst>
+                                  <p:childTnLst>
+                                    <p:set>
+                                      <p:cBhvr>
+                                        <p:cTn id="73" dur="1" fill="hold">
+                                          <p:stCondLst>
+                                            <p:cond delay="0"/>
+                                          </p:stCondLst>
+                                        </p:cTn>
+                                        <p:tgtEl>
+                                          <p:spTgt spid="24"/>
+                                        </p:tgtEl>
+                                        <p:attrNameLst>
+                                          <p:attrName>style.visibility</p:attrName>
+                                        </p:attrNameLst>
+                                      </p:cBhvr>
+                                      <p:to>
+                                        <p:strVal val="visible"/>
+                                      </p:to>
+                                    </p:set>
+                                    <p:animEffect transition="in" filter="fade">
+                                      <p:cBhvr>
+                                        <p:cTn id="74" dur="500"/>
+                                        <p:tgtEl>
+                                          <p:spTgt spid="24"/>
+                                        </p:tgtEl>
+                                      </p:cBhvr>
+                                    </p:animEffect>
+                                  </p:childTnLst>
+                                </p:cTn>
+                              </p:par>
+                              <p:par>
+                                <p:cTn id="75" presetID="10" presetClass="entr" presetSubtype="0" fill="hold" grpId="0" nodeType="withEffect">
+                                  <p:stCondLst>
+                                    <p:cond delay="0"/>
+                                  </p:stCondLst>
+                                  <p:childTnLst>
+                                    <p:set>
+                                      <p:cBhvr>
+                                        <p:cTn id="76" dur="1" fill="hold">
+                                          <p:stCondLst>
+                                            <p:cond delay="0"/>
+                                          </p:stCondLst>
+                                        </p:cTn>
+                                        <p:tgtEl>
+                                          <p:spTgt spid="37"/>
+                                        </p:tgtEl>
+                                        <p:attrNameLst>
+                                          <p:attrName>style.visibility</p:attrName>
+                                        </p:attrNameLst>
+                                      </p:cBhvr>
+                                      <p:to>
+                                        <p:strVal val="visible"/>
+                                      </p:to>
+                                    </p:set>
+                                    <p:animEffect transition="in" filter="fade">
+                                      <p:cBhvr>
+                                        <p:cTn id="77" dur="500"/>
+                                        <p:tgtEl>
+                                          <p:spTgt spid="37"/>
+                                        </p:tgtEl>
+                                      </p:cBhvr>
+                                    </p:animEffect>
+                                  </p:childTnLst>
+                                </p:cTn>
+                              </p:par>
+                              <p:par>
+                                <p:cTn id="78" presetID="10" presetClass="entr" presetSubtype="0" fill="hold" nodeType="withEffect">
+                                  <p:stCondLst>
+                                    <p:cond delay="0"/>
+                                  </p:stCondLst>
+                                  <p:childTnLst>
+                                    <p:set>
+                                      <p:cBhvr>
+                                        <p:cTn id="79" dur="1" fill="hold">
+                                          <p:stCondLst>
+                                            <p:cond delay="0"/>
+                                          </p:stCondLst>
+                                        </p:cTn>
+                                        <p:tgtEl>
+                                          <p:spTgt spid="22"/>
+                                        </p:tgtEl>
+                                        <p:attrNameLst>
+                                          <p:attrName>style.visibility</p:attrName>
+                                        </p:attrNameLst>
+                                      </p:cBhvr>
+                                      <p:to>
+                                        <p:strVal val="visible"/>
+                                      </p:to>
+                                    </p:set>
+                                    <p:animEffect transition="in" filter="fade">
+                                      <p:cBhvr>
+                                        <p:cTn id="80" dur="500"/>
+                                        <p:tgtEl>
+                                          <p:spTgt spid="22"/>
+                                        </p:tgtEl>
+                                      </p:cBhvr>
+                                    </p:animEffect>
+                                  </p:childTnLst>
+                                </p:cTn>
+                              </p:par>
+                            </p:childTnLst>
+                          </p:cTn>
+                        </p:par>
+                        <p:par>
+                          <p:cTn id="81" fill="hold">
+                            <p:stCondLst>
+                              <p:cond delay="5000"/>
+                            </p:stCondLst>
+                            <p:childTnLst>
+                              <p:par>
+                                <p:cTn id="82" presetID="16" presetClass="entr" presetSubtype="37" fill="hold" grpId="0" nodeType="afterEffect">
+                                  <p:stCondLst>
+                                    <p:cond delay="0"/>
+                                  </p:stCondLst>
+                                  <p:childTnLst>
+                                    <p:set>
+                                      <p:cBhvr>
+                                        <p:cTn id="83" dur="1" fill="hold">
+                                          <p:stCondLst>
+                                            <p:cond delay="0"/>
+                                          </p:stCondLst>
+                                        </p:cTn>
+                                        <p:tgtEl>
+                                          <p:spTgt spid="30"/>
+                                        </p:tgtEl>
+                                        <p:attrNameLst>
+                                          <p:attrName>style.visibility</p:attrName>
+                                        </p:attrNameLst>
+                                      </p:cBhvr>
+                                      <p:to>
+                                        <p:strVal val="visible"/>
+                                      </p:to>
+                                    </p:set>
+                                    <p:animEffect transition="in" filter="barn(outVertical)">
+                                      <p:cBhvr>
+                                        <p:cTn id="84" dur="500"/>
+                                        <p:tgtEl>
+                                          <p:spTgt spid="30"/>
+                                        </p:tgtEl>
+                                      </p:cBhvr>
+                                    </p:animEffect>
+                                  </p:childTnLst>
+                                </p:cTn>
+                              </p:par>
+                            </p:childTnLst>
+                          </p:cTn>
+                        </p:par>
+                      </p:childTnLst>
+                    </p:cTn>
+                  </p:par>
+                </p:childTnLst>
+              </p:cTn>
+              <p:prevCondLst>
+                <p:cond evt="onPrev" delay="0">
+                  <p:tgtEl>
+                    <p:sldTgt/>
+                  </p:tgtEl>
+                </p:cond>
+              </p:prevCondLst>
+              <p:nextCondLst>
+                <p:cond evt="onNext" delay="0">
+                  <p:tgtEl>
+                    <p:sldTgt/>
+                  </p:tgtEl>
+                </p:cond>
+              </p:nextCondLst>
+            </p:seq>
+          </p:childTnLst>
+        </p:cTn>
       </p:par>
     </p:tnLst>
+    <p:bldLst>
+      <p:bldP spid="24" grpId="0" animBg="1"/>
+      <p:bldP spid="15" grpId="0" animBg="1"/>
+      <p:bldP spid="20" grpId="0" animBg="1"/>
+      <p:bldP spid="25" grpId="0"/>
+      <p:bldP spid="26" grpId="0"/>
+      <p:bldP spid="27" grpId="0"/>
+      <p:bldP spid="28" grpId="0"/>
+      <p:bldP spid="29" grpId="0"/>
+      <p:bldP spid="30" grpId="0" animBg="1"/>
+      <p:bldP spid="33" grpId="0" build="p"/>
+      <p:bldP spid="34" grpId="0" build="p"/>
+      <p:bldP spid="36" grpId="0"/>
+      <p:bldP spid="37" grpId="0"/>
+      <p:bldP spid="40" grpId="0"/>
+    </p:bldLst>
   </p:timing>
 </p:sld>
 </file>
@@ -7534,9 +8504,178 @@
   <p:timing>
     <p:tnLst>
       <p:par>
-        <p:cTn id="1" dur="indefinite" restart="never" nodeType="tmRoot"/>
+        <p:cTn id="1" dur="indefinite" restart="never" nodeType="tmRoot">
+          <p:childTnLst>
+            <p:seq concurrent="1" nextAc="seek">
+              <p:cTn id="2" dur="indefinite" nodeType="mainSeq">
+                <p:childTnLst>
+                  <p:par>
+                    <p:cTn id="3" fill="hold">
+                      <p:stCondLst>
+                        <p:cond delay="indefinite"/>
+                      </p:stCondLst>
+                      <p:childTnLst>
+                        <p:par>
+                          <p:cTn id="4" fill="hold">
+                            <p:stCondLst>
+                              <p:cond delay="0"/>
+                            </p:stCondLst>
+                            <p:childTnLst>
+                              <p:par>
+                                <p:cTn id="5" presetID="10" presetClass="entr" presetSubtype="0" fill="hold" grpId="0" nodeType="clickEffect">
+                                  <p:stCondLst>
+                                    <p:cond delay="0"/>
+                                  </p:stCondLst>
+                                  <p:childTnLst>
+                                    <p:set>
+                                      <p:cBhvr>
+                                        <p:cTn id="6" dur="1" fill="hold">
+                                          <p:stCondLst>
+                                            <p:cond delay="0"/>
+                                          </p:stCondLst>
+                                        </p:cTn>
+                                        <p:tgtEl>
+                                          <p:spTgt spid="25"/>
+                                        </p:tgtEl>
+                                        <p:attrNameLst>
+                                          <p:attrName>style.visibility</p:attrName>
+                                        </p:attrNameLst>
+                                      </p:cBhvr>
+                                      <p:to>
+                                        <p:strVal val="visible"/>
+                                      </p:to>
+                                    </p:set>
+                                    <p:animEffect transition="in" filter="fade">
+                                      <p:cBhvr>
+                                        <p:cTn id="7" dur="500"/>
+                                        <p:tgtEl>
+                                          <p:spTgt spid="25"/>
+                                        </p:tgtEl>
+                                      </p:cBhvr>
+                                    </p:animEffect>
+                                  </p:childTnLst>
+                                </p:cTn>
+                              </p:par>
+                            </p:childTnLst>
+                          </p:cTn>
+                        </p:par>
+                        <p:par>
+                          <p:cTn id="8" fill="hold">
+                            <p:stCondLst>
+                              <p:cond delay="500"/>
+                            </p:stCondLst>
+                            <p:childTnLst>
+                              <p:par>
+                                <p:cTn id="9" presetID="10" presetClass="entr" presetSubtype="0" fill="hold" grpId="0" nodeType="afterEffect">
+                                  <p:stCondLst>
+                                    <p:cond delay="250"/>
+                                  </p:stCondLst>
+                                  <p:childTnLst>
+                                    <p:set>
+                                      <p:cBhvr>
+                                        <p:cTn id="10" dur="1" fill="hold">
+                                          <p:stCondLst>
+                                            <p:cond delay="0"/>
+                                          </p:stCondLst>
+                                        </p:cTn>
+                                        <p:tgtEl>
+                                          <p:spTgt spid="24"/>
+                                        </p:tgtEl>
+                                        <p:attrNameLst>
+                                          <p:attrName>style.visibility</p:attrName>
+                                        </p:attrNameLst>
+                                      </p:cBhvr>
+                                      <p:to>
+                                        <p:strVal val="visible"/>
+                                      </p:to>
+                                    </p:set>
+                                    <p:animEffect transition="in" filter="fade">
+                                      <p:cBhvr>
+                                        <p:cTn id="11" dur="500"/>
+                                        <p:tgtEl>
+                                          <p:spTgt spid="24"/>
+                                        </p:tgtEl>
+                                      </p:cBhvr>
+                                    </p:animEffect>
+                                  </p:childTnLst>
+                                </p:cTn>
+                              </p:par>
+                            </p:childTnLst>
+                          </p:cTn>
+                        </p:par>
+                        <p:par>
+                          <p:cTn id="12" fill="hold">
+                            <p:stCondLst>
+                              <p:cond delay="1250"/>
+                            </p:stCondLst>
+                            <p:childTnLst>
+                              <p:par>
+                                <p:cTn id="13" presetID="10" presetClass="entr" presetSubtype="0" fill="hold" grpId="0" nodeType="afterEffect">
+                                  <p:stCondLst>
+                                    <p:cond delay="250"/>
+                                  </p:stCondLst>
+                                  <p:childTnLst>
+                                    <p:set>
+                                      <p:cBhvr>
+                                        <p:cTn id="14" dur="1" fill="hold">
+                                          <p:stCondLst>
+                                            <p:cond delay="0"/>
+                                          </p:stCondLst>
+                                        </p:cTn>
+                                        <p:tgtEl>
+                                          <p:spTgt spid="23"/>
+                                        </p:tgtEl>
+                                        <p:attrNameLst>
+                                          <p:attrName>style.visibility</p:attrName>
+                                        </p:attrNameLst>
+                                      </p:cBhvr>
+                                      <p:to>
+                                        <p:strVal val="visible"/>
+                                      </p:to>
+                                    </p:set>
+                                    <p:animEffect transition="in" filter="fade">
+                                      <p:cBhvr>
+                                        <p:cTn id="15" dur="500"/>
+                                        <p:tgtEl>
+                                          <p:spTgt spid="23"/>
+                                        </p:tgtEl>
+                                      </p:cBhvr>
+                                    </p:animEffect>
+                                  </p:childTnLst>
+                                </p:cTn>
+                              </p:par>
+                            </p:childTnLst>
+                          </p:cTn>
+                        </p:par>
+                      </p:childTnLst>
+                    </p:cTn>
+                  </p:par>
+                </p:childTnLst>
+              </p:cTn>
+              <p:prevCondLst>
+                <p:cond evt="onPrev" delay="0">
+                  <p:tgtEl>
+                    <p:sldTgt/>
+                  </p:tgtEl>
+                </p:cond>
+              </p:prevCondLst>
+              <p:nextCondLst>
+                <p:cond evt="onNext" delay="0">
+                  <p:tgtEl>
+                    <p:sldTgt/>
+                  </p:tgtEl>
+                </p:cond>
+              </p:nextCondLst>
+            </p:seq>
+          </p:childTnLst>
+        </p:cTn>
       </p:par>
     </p:tnLst>
+    <p:bldLst>
+      <p:bldP spid="23" grpId="0" animBg="1"/>
+      <p:bldP spid="24" grpId="0" animBg="1"/>
+      <p:bldP spid="25" grpId="0" animBg="1"/>
+    </p:bldLst>
   </p:timing>
 </p:sld>
 </file>
@@ -8029,11 +9168,7 @@
             </a:pPr>
             <a:r>
               <a:rPr lang="fr-FR" dirty="0"/>
-              <a:t>m</a:t>
-            </a:r>
-            <a:r>
-              <a:rPr lang="fr-FR" dirty="0"/>
-              <a:t>ove/</a:t>
+              <a:t>move/</a:t>
             </a:r>
           </a:p>
           <a:p>
@@ -8163,9 +9298,134 @@
   <p:timing>
     <p:tnLst>
       <p:par>
-        <p:cTn id="1" dur="indefinite" restart="never" nodeType="tmRoot"/>
+        <p:cTn id="1" dur="indefinite" restart="never" nodeType="tmRoot">
+          <p:childTnLst>
+            <p:seq concurrent="1" nextAc="seek">
+              <p:cTn id="2" dur="indefinite" nodeType="mainSeq">
+                <p:childTnLst>
+                  <p:par>
+                    <p:cTn id="3" fill="hold">
+                      <p:stCondLst>
+                        <p:cond delay="indefinite"/>
+                      </p:stCondLst>
+                      <p:childTnLst>
+                        <p:par>
+                          <p:cTn id="4" fill="hold">
+                            <p:stCondLst>
+                              <p:cond delay="0"/>
+                            </p:stCondLst>
+                            <p:childTnLst>
+                              <p:par>
+                                <p:cTn id="5" presetID="42" presetClass="entr" presetSubtype="0" fill="hold" grpId="0" nodeType="clickEffect">
+                                  <p:stCondLst>
+                                    <p:cond delay="1000"/>
+                                  </p:stCondLst>
+                                  <p:childTnLst>
+                                    <p:set>
+                                      <p:cBhvr>
+                                        <p:cTn id="6" dur="1" fill="hold">
+                                          <p:stCondLst>
+                                            <p:cond delay="0"/>
+                                          </p:stCondLst>
+                                        </p:cTn>
+                                        <p:tgtEl>
+                                          <p:spTgt spid="31"/>
+                                        </p:tgtEl>
+                                        <p:attrNameLst>
+                                          <p:attrName>style.visibility</p:attrName>
+                                        </p:attrNameLst>
+                                      </p:cBhvr>
+                                      <p:to>
+                                        <p:strVal val="visible"/>
+                                      </p:to>
+                                    </p:set>
+                                    <p:animEffect transition="in" filter="fade">
+                                      <p:cBhvr>
+                                        <p:cTn id="7" dur="500"/>
+                                        <p:tgtEl>
+                                          <p:spTgt spid="31"/>
+                                        </p:tgtEl>
+                                      </p:cBhvr>
+                                    </p:animEffect>
+                                    <p:anim calcmode="lin" valueType="num">
+                                      <p:cBhvr>
+                                        <p:cTn id="8" dur="500" fill="hold"/>
+                                        <p:tgtEl>
+                                          <p:spTgt spid="31"/>
+                                        </p:tgtEl>
+                                        <p:attrNameLst>
+                                          <p:attrName>ppt_x</p:attrName>
+                                        </p:attrNameLst>
+                                      </p:cBhvr>
+                                      <p:tavLst>
+                                        <p:tav tm="0">
+                                          <p:val>
+                                            <p:strVal val="#ppt_x"/>
+                                          </p:val>
+                                        </p:tav>
+                                        <p:tav tm="100000">
+                                          <p:val>
+                                            <p:strVal val="#ppt_x"/>
+                                          </p:val>
+                                        </p:tav>
+                                      </p:tavLst>
+                                    </p:anim>
+                                    <p:anim calcmode="lin" valueType="num">
+                                      <p:cBhvr>
+                                        <p:cTn id="9" dur="500" fill="hold"/>
+                                        <p:tgtEl>
+                                          <p:spTgt spid="31"/>
+                                        </p:tgtEl>
+                                        <p:attrNameLst>
+                                          <p:attrName>ppt_y</p:attrName>
+                                        </p:attrNameLst>
+                                      </p:cBhvr>
+                                      <p:tavLst>
+                                        <p:tav tm="0">
+                                          <p:val>
+                                            <p:strVal val="#ppt_y+.1"/>
+                                          </p:val>
+                                        </p:tav>
+                                        <p:tav tm="100000">
+                                          <p:val>
+                                            <p:strVal val="#ppt_y"/>
+                                          </p:val>
+                                        </p:tav>
+                                      </p:tavLst>
+                                    </p:anim>
+                                  </p:childTnLst>
+                                </p:cTn>
+                              </p:par>
+                            </p:childTnLst>
+                          </p:cTn>
+                        </p:par>
+                      </p:childTnLst>
+                    </p:cTn>
+                  </p:par>
+                </p:childTnLst>
+              </p:cTn>
+              <p:prevCondLst>
+                <p:cond evt="onPrev" delay="0">
+                  <p:tgtEl>
+                    <p:sldTgt/>
+                  </p:tgtEl>
+                </p:cond>
+              </p:prevCondLst>
+              <p:nextCondLst>
+                <p:cond evt="onNext" delay="0">
+                  <p:tgtEl>
+                    <p:sldTgt/>
+                  </p:tgtEl>
+                </p:cond>
+              </p:nextCondLst>
+            </p:seq>
+          </p:childTnLst>
+        </p:cTn>
       </p:par>
     </p:tnLst>
+    <p:bldLst>
+      <p:bldP spid="31" grpId="0" animBg="1"/>
+    </p:bldLst>
   </p:timing>
 </p:sld>
 </file>
@@ -11178,878 +12438,7 @@
   <p:timing>
     <p:tnLst>
       <p:par>
-        <p:cTn id="1" dur="indefinite" restart="never" nodeType="tmRoot">
-          <p:childTnLst>
-            <p:seq concurrent="1" nextAc="seek">
-              <p:cTn id="2" dur="indefinite" nodeType="mainSeq">
-                <p:childTnLst>
-                  <p:par>
-                    <p:cTn id="3" fill="hold">
-                      <p:stCondLst>
-                        <p:cond delay="indefinite"/>
-                        <p:cond evt="onBegin" delay="0">
-                          <p:tn val="2"/>
-                        </p:cond>
-                      </p:stCondLst>
-                      <p:childTnLst>
-                        <p:par>
-                          <p:cTn id="4" fill="hold">
-                            <p:stCondLst>
-                              <p:cond delay="0"/>
-                            </p:stCondLst>
-                            <p:childTnLst>
-                              <p:par>
-                                <p:cTn id="5" presetID="10" presetClass="entr" presetSubtype="0" fill="hold" nodeType="afterEffect">
-                                  <p:stCondLst>
-                                    <p:cond delay="0"/>
-                                  </p:stCondLst>
-                                  <p:childTnLst>
-                                    <p:set>
-                                      <p:cBhvr>
-                                        <p:cTn id="6" dur="1" fill="hold">
-                                          <p:stCondLst>
-                                            <p:cond delay="0"/>
-                                          </p:stCondLst>
-                                        </p:cTn>
-                                        <p:tgtEl>
-                                          <p:spTgt spid="30"/>
-                                        </p:tgtEl>
-                                        <p:attrNameLst>
-                                          <p:attrName>style.visibility</p:attrName>
-                                        </p:attrNameLst>
-                                      </p:cBhvr>
-                                      <p:to>
-                                        <p:strVal val="visible"/>
-                                      </p:to>
-                                    </p:set>
-                                    <p:animEffect transition="in" filter="fade">
-                                      <p:cBhvr>
-                                        <p:cTn id="7" dur="500"/>
-                                        <p:tgtEl>
-                                          <p:spTgt spid="30"/>
-                                        </p:tgtEl>
-                                      </p:cBhvr>
-                                    </p:animEffect>
-                                  </p:childTnLst>
-                                </p:cTn>
-                              </p:par>
-                            </p:childTnLst>
-                          </p:cTn>
-                        </p:par>
-                        <p:par>
-                          <p:cTn id="8" fill="hold">
-                            <p:stCondLst>
-                              <p:cond delay="500"/>
-                            </p:stCondLst>
-                            <p:childTnLst>
-                              <p:par>
-                                <p:cTn id="9" presetID="10" presetClass="entr" presetSubtype="0" fill="hold" nodeType="afterEffect">
-                                  <p:stCondLst>
-                                    <p:cond delay="0"/>
-                                  </p:stCondLst>
-                                  <p:childTnLst>
-                                    <p:set>
-                                      <p:cBhvr>
-                                        <p:cTn id="10" dur="1" fill="hold">
-                                          <p:stCondLst>
-                                            <p:cond delay="0"/>
-                                          </p:stCondLst>
-                                        </p:cTn>
-                                        <p:tgtEl>
-                                          <p:spTgt spid="31"/>
-                                        </p:tgtEl>
-                                        <p:attrNameLst>
-                                          <p:attrName>style.visibility</p:attrName>
-                                        </p:attrNameLst>
-                                      </p:cBhvr>
-                                      <p:to>
-                                        <p:strVal val="visible"/>
-                                      </p:to>
-                                    </p:set>
-                                    <p:animEffect transition="in" filter="fade">
-                                      <p:cBhvr>
-                                        <p:cTn id="11" dur="500"/>
-                                        <p:tgtEl>
-                                          <p:spTgt spid="31"/>
-                                        </p:tgtEl>
-                                      </p:cBhvr>
-                                    </p:animEffect>
-                                  </p:childTnLst>
-                                </p:cTn>
-                              </p:par>
-                            </p:childTnLst>
-                          </p:cTn>
-                        </p:par>
-                        <p:par>
-                          <p:cTn id="12" fill="hold">
-                            <p:stCondLst>
-                              <p:cond delay="1000"/>
-                            </p:stCondLst>
-                            <p:childTnLst>
-                              <p:par>
-                                <p:cTn id="13" presetID="10" presetClass="entr" presetSubtype="0" fill="hold" nodeType="afterEffect">
-                                  <p:stCondLst>
-                                    <p:cond delay="0"/>
-                                  </p:stCondLst>
-                                  <p:childTnLst>
-                                    <p:set>
-                                      <p:cBhvr>
-                                        <p:cTn id="14" dur="1" fill="hold">
-                                          <p:stCondLst>
-                                            <p:cond delay="0"/>
-                                          </p:stCondLst>
-                                        </p:cTn>
-                                        <p:tgtEl>
-                                          <p:spTgt spid="32"/>
-                                        </p:tgtEl>
-                                        <p:attrNameLst>
-                                          <p:attrName>style.visibility</p:attrName>
-                                        </p:attrNameLst>
-                                      </p:cBhvr>
-                                      <p:to>
-                                        <p:strVal val="visible"/>
-                                      </p:to>
-                                    </p:set>
-                                    <p:animEffect transition="in" filter="fade">
-                                      <p:cBhvr>
-                                        <p:cTn id="15" dur="500"/>
-                                        <p:tgtEl>
-                                          <p:spTgt spid="32"/>
-                                        </p:tgtEl>
-                                      </p:cBhvr>
-                                    </p:animEffect>
-                                  </p:childTnLst>
-                                </p:cTn>
-                              </p:par>
-                            </p:childTnLst>
-                          </p:cTn>
-                        </p:par>
-                        <p:par>
-                          <p:cTn id="16" fill="hold">
-                            <p:stCondLst>
-                              <p:cond delay="1500"/>
-                            </p:stCondLst>
-                            <p:childTnLst>
-                              <p:par>
-                                <p:cTn id="17" presetID="10" presetClass="entr" presetSubtype="0" fill="hold" nodeType="afterEffect">
-                                  <p:stCondLst>
-                                    <p:cond delay="0"/>
-                                  </p:stCondLst>
-                                  <p:childTnLst>
-                                    <p:set>
-                                      <p:cBhvr>
-                                        <p:cTn id="18" dur="1" fill="hold">
-                                          <p:stCondLst>
-                                            <p:cond delay="0"/>
-                                          </p:stCondLst>
-                                        </p:cTn>
-                                        <p:tgtEl>
-                                          <p:spTgt spid="33"/>
-                                        </p:tgtEl>
-                                        <p:attrNameLst>
-                                          <p:attrName>style.visibility</p:attrName>
-                                        </p:attrNameLst>
-                                      </p:cBhvr>
-                                      <p:to>
-                                        <p:strVal val="visible"/>
-                                      </p:to>
-                                    </p:set>
-                                    <p:animEffect transition="in" filter="fade">
-                                      <p:cBhvr>
-                                        <p:cTn id="19" dur="500"/>
-                                        <p:tgtEl>
-                                          <p:spTgt spid="33"/>
-                                        </p:tgtEl>
-                                      </p:cBhvr>
-                                    </p:animEffect>
-                                  </p:childTnLst>
-                                </p:cTn>
-                              </p:par>
-                            </p:childTnLst>
-                          </p:cTn>
-                        </p:par>
-                        <p:par>
-                          <p:cTn id="20" fill="hold">
-                            <p:stCondLst>
-                              <p:cond delay="2000"/>
-                            </p:stCondLst>
-                            <p:childTnLst>
-                              <p:par>
-                                <p:cTn id="21" presetID="10" presetClass="entr" presetSubtype="0" fill="hold" nodeType="afterEffect">
-                                  <p:stCondLst>
-                                    <p:cond delay="0"/>
-                                  </p:stCondLst>
-                                  <p:childTnLst>
-                                    <p:set>
-                                      <p:cBhvr>
-                                        <p:cTn id="22" dur="1" fill="hold">
-                                          <p:stCondLst>
-                                            <p:cond delay="0"/>
-                                          </p:stCondLst>
-                                        </p:cTn>
-                                        <p:tgtEl>
-                                          <p:spTgt spid="37"/>
-                                        </p:tgtEl>
-                                        <p:attrNameLst>
-                                          <p:attrName>style.visibility</p:attrName>
-                                        </p:attrNameLst>
-                                      </p:cBhvr>
-                                      <p:to>
-                                        <p:strVal val="visible"/>
-                                      </p:to>
-                                    </p:set>
-                                    <p:animEffect transition="in" filter="fade">
-                                      <p:cBhvr>
-                                        <p:cTn id="23" dur="500"/>
-                                        <p:tgtEl>
-                                          <p:spTgt spid="37"/>
-                                        </p:tgtEl>
-                                      </p:cBhvr>
-                                    </p:animEffect>
-                                  </p:childTnLst>
-                                </p:cTn>
-                              </p:par>
-                            </p:childTnLst>
-                          </p:cTn>
-                        </p:par>
-                        <p:par>
-                          <p:cTn id="24" fill="hold">
-                            <p:stCondLst>
-                              <p:cond delay="2500"/>
-                            </p:stCondLst>
-                            <p:childTnLst>
-                              <p:par>
-                                <p:cTn id="25" presetID="10" presetClass="entr" presetSubtype="0" fill="hold" nodeType="afterEffect">
-                                  <p:stCondLst>
-                                    <p:cond delay="0"/>
-                                  </p:stCondLst>
-                                  <p:childTnLst>
-                                    <p:set>
-                                      <p:cBhvr>
-                                        <p:cTn id="26" dur="1" fill="hold">
-                                          <p:stCondLst>
-                                            <p:cond delay="0"/>
-                                          </p:stCondLst>
-                                        </p:cTn>
-                                        <p:tgtEl>
-                                          <p:spTgt spid="39"/>
-                                        </p:tgtEl>
-                                        <p:attrNameLst>
-                                          <p:attrName>style.visibility</p:attrName>
-                                        </p:attrNameLst>
-                                      </p:cBhvr>
-                                      <p:to>
-                                        <p:strVal val="visible"/>
-                                      </p:to>
-                                    </p:set>
-                                    <p:animEffect transition="in" filter="fade">
-                                      <p:cBhvr>
-                                        <p:cTn id="27" dur="500"/>
-                                        <p:tgtEl>
-                                          <p:spTgt spid="39"/>
-                                        </p:tgtEl>
-                                      </p:cBhvr>
-                                    </p:animEffect>
-                                  </p:childTnLst>
-                                </p:cTn>
-                              </p:par>
-                            </p:childTnLst>
-                          </p:cTn>
-                        </p:par>
-                        <p:par>
-                          <p:cTn id="28" fill="hold">
-                            <p:stCondLst>
-                              <p:cond delay="3000"/>
-                            </p:stCondLst>
-                            <p:childTnLst>
-                              <p:par>
-                                <p:cTn id="29" presetID="10" presetClass="entr" presetSubtype="0" fill="hold" nodeType="afterEffect">
-                                  <p:stCondLst>
-                                    <p:cond delay="0"/>
-                                  </p:stCondLst>
-                                  <p:childTnLst>
-                                    <p:set>
-                                      <p:cBhvr>
-                                        <p:cTn id="30" dur="1" fill="hold">
-                                          <p:stCondLst>
-                                            <p:cond delay="0"/>
-                                          </p:stCondLst>
-                                        </p:cTn>
-                                        <p:tgtEl>
-                                          <p:spTgt spid="43"/>
-                                        </p:tgtEl>
-                                        <p:attrNameLst>
-                                          <p:attrName>style.visibility</p:attrName>
-                                        </p:attrNameLst>
-                                      </p:cBhvr>
-                                      <p:to>
-                                        <p:strVal val="visible"/>
-                                      </p:to>
-                                    </p:set>
-                                    <p:animEffect transition="in" filter="fade">
-                                      <p:cBhvr>
-                                        <p:cTn id="31" dur="500"/>
-                                        <p:tgtEl>
-                                          <p:spTgt spid="43"/>
-                                        </p:tgtEl>
-                                      </p:cBhvr>
-                                    </p:animEffect>
-                                  </p:childTnLst>
-                                </p:cTn>
-                              </p:par>
-                            </p:childTnLst>
-                          </p:cTn>
-                        </p:par>
-                        <p:par>
-                          <p:cTn id="32" fill="hold">
-                            <p:stCondLst>
-                              <p:cond delay="3500"/>
-                            </p:stCondLst>
-                            <p:childTnLst>
-                              <p:par>
-                                <p:cTn id="33" presetID="10" presetClass="entr" presetSubtype="0" fill="hold" nodeType="afterEffect">
-                                  <p:stCondLst>
-                                    <p:cond delay="0"/>
-                                  </p:stCondLst>
-                                  <p:childTnLst>
-                                    <p:set>
-                                      <p:cBhvr>
-                                        <p:cTn id="34" dur="1" fill="hold">
-                                          <p:stCondLst>
-                                            <p:cond delay="0"/>
-                                          </p:stCondLst>
-                                        </p:cTn>
-                                        <p:tgtEl>
-                                          <p:spTgt spid="45"/>
-                                        </p:tgtEl>
-                                        <p:attrNameLst>
-                                          <p:attrName>style.visibility</p:attrName>
-                                        </p:attrNameLst>
-                                      </p:cBhvr>
-                                      <p:to>
-                                        <p:strVal val="visible"/>
-                                      </p:to>
-                                    </p:set>
-                                    <p:animEffect transition="in" filter="fade">
-                                      <p:cBhvr>
-                                        <p:cTn id="35" dur="500"/>
-                                        <p:tgtEl>
-                                          <p:spTgt spid="45"/>
-                                        </p:tgtEl>
-                                      </p:cBhvr>
-                                    </p:animEffect>
-                                  </p:childTnLst>
-                                </p:cTn>
-                              </p:par>
-                            </p:childTnLst>
-                          </p:cTn>
-                        </p:par>
-                        <p:par>
-                          <p:cTn id="36" fill="hold">
-                            <p:stCondLst>
-                              <p:cond delay="4000"/>
-                            </p:stCondLst>
-                            <p:childTnLst>
-                              <p:par>
-                                <p:cTn id="37" presetID="10" presetClass="entr" presetSubtype="0" fill="hold" nodeType="afterEffect">
-                                  <p:stCondLst>
-                                    <p:cond delay="0"/>
-                                  </p:stCondLst>
-                                  <p:childTnLst>
-                                    <p:set>
-                                      <p:cBhvr>
-                                        <p:cTn id="38" dur="1" fill="hold">
-                                          <p:stCondLst>
-                                            <p:cond delay="0"/>
-                                          </p:stCondLst>
-                                        </p:cTn>
-                                        <p:tgtEl>
-                                          <p:spTgt spid="46"/>
-                                        </p:tgtEl>
-                                        <p:attrNameLst>
-                                          <p:attrName>style.visibility</p:attrName>
-                                        </p:attrNameLst>
-                                      </p:cBhvr>
-                                      <p:to>
-                                        <p:strVal val="visible"/>
-                                      </p:to>
-                                    </p:set>
-                                    <p:animEffect transition="in" filter="fade">
-                                      <p:cBhvr>
-                                        <p:cTn id="39" dur="500"/>
-                                        <p:tgtEl>
-                                          <p:spTgt spid="46"/>
-                                        </p:tgtEl>
-                                      </p:cBhvr>
-                                    </p:animEffect>
-                                  </p:childTnLst>
-                                </p:cTn>
-                              </p:par>
-                            </p:childTnLst>
-                          </p:cTn>
-                        </p:par>
-                        <p:par>
-                          <p:cTn id="40" fill="hold">
-                            <p:stCondLst>
-                              <p:cond delay="4500"/>
-                            </p:stCondLst>
-                            <p:childTnLst>
-                              <p:par>
-                                <p:cTn id="41" presetID="10" presetClass="entr" presetSubtype="0" fill="hold" nodeType="afterEffect">
-                                  <p:stCondLst>
-                                    <p:cond delay="0"/>
-                                  </p:stCondLst>
-                                  <p:childTnLst>
-                                    <p:set>
-                                      <p:cBhvr>
-                                        <p:cTn id="42" dur="1" fill="hold">
-                                          <p:stCondLst>
-                                            <p:cond delay="0"/>
-                                          </p:stCondLst>
-                                        </p:cTn>
-                                        <p:tgtEl>
-                                          <p:spTgt spid="47"/>
-                                        </p:tgtEl>
-                                        <p:attrNameLst>
-                                          <p:attrName>style.visibility</p:attrName>
-                                        </p:attrNameLst>
-                                      </p:cBhvr>
-                                      <p:to>
-                                        <p:strVal val="visible"/>
-                                      </p:to>
-                                    </p:set>
-                                    <p:animEffect transition="in" filter="fade">
-                                      <p:cBhvr>
-                                        <p:cTn id="43" dur="500"/>
-                                        <p:tgtEl>
-                                          <p:spTgt spid="47"/>
-                                        </p:tgtEl>
-                                      </p:cBhvr>
-                                    </p:animEffect>
-                                  </p:childTnLst>
-                                </p:cTn>
-                              </p:par>
-                            </p:childTnLst>
-                          </p:cTn>
-                        </p:par>
-                        <p:par>
-                          <p:cTn id="44" fill="hold">
-                            <p:stCondLst>
-                              <p:cond delay="5000"/>
-                            </p:stCondLst>
-                            <p:childTnLst>
-                              <p:par>
-                                <p:cTn id="45" presetID="10" presetClass="entr" presetSubtype="0" fill="hold" nodeType="afterEffect">
-                                  <p:stCondLst>
-                                    <p:cond delay="0"/>
-                                  </p:stCondLst>
-                                  <p:childTnLst>
-                                    <p:set>
-                                      <p:cBhvr>
-                                        <p:cTn id="46" dur="1" fill="hold">
-                                          <p:stCondLst>
-                                            <p:cond delay="0"/>
-                                          </p:stCondLst>
-                                        </p:cTn>
-                                        <p:tgtEl>
-                                          <p:spTgt spid="48"/>
-                                        </p:tgtEl>
-                                        <p:attrNameLst>
-                                          <p:attrName>style.visibility</p:attrName>
-                                        </p:attrNameLst>
-                                      </p:cBhvr>
-                                      <p:to>
-                                        <p:strVal val="visible"/>
-                                      </p:to>
-                                    </p:set>
-                                    <p:animEffect transition="in" filter="fade">
-                                      <p:cBhvr>
-                                        <p:cTn id="47" dur="500"/>
-                                        <p:tgtEl>
-                                          <p:spTgt spid="48"/>
-                                        </p:tgtEl>
-                                      </p:cBhvr>
-                                    </p:animEffect>
-                                  </p:childTnLst>
-                                </p:cTn>
-                              </p:par>
-                            </p:childTnLst>
-                          </p:cTn>
-                        </p:par>
-                        <p:par>
-                          <p:cTn id="48" fill="hold">
-                            <p:stCondLst>
-                              <p:cond delay="5500"/>
-                            </p:stCondLst>
-                            <p:childTnLst>
-                              <p:par>
-                                <p:cTn id="49" presetID="10" presetClass="entr" presetSubtype="0" fill="hold" nodeType="afterEffect">
-                                  <p:stCondLst>
-                                    <p:cond delay="0"/>
-                                  </p:stCondLst>
-                                  <p:childTnLst>
-                                    <p:set>
-                                      <p:cBhvr>
-                                        <p:cTn id="50" dur="1" fill="hold">
-                                          <p:stCondLst>
-                                            <p:cond delay="0"/>
-                                          </p:stCondLst>
-                                        </p:cTn>
-                                        <p:tgtEl>
-                                          <p:spTgt spid="49"/>
-                                        </p:tgtEl>
-                                        <p:attrNameLst>
-                                          <p:attrName>style.visibility</p:attrName>
-                                        </p:attrNameLst>
-                                      </p:cBhvr>
-                                      <p:to>
-                                        <p:strVal val="visible"/>
-                                      </p:to>
-                                    </p:set>
-                                    <p:animEffect transition="in" filter="fade">
-                                      <p:cBhvr>
-                                        <p:cTn id="51" dur="500"/>
-                                        <p:tgtEl>
-                                          <p:spTgt spid="49"/>
-                                        </p:tgtEl>
-                                      </p:cBhvr>
-                                    </p:animEffect>
-                                  </p:childTnLst>
-                                </p:cTn>
-                              </p:par>
-                            </p:childTnLst>
-                          </p:cTn>
-                        </p:par>
-                        <p:par>
-                          <p:cTn id="52" fill="hold">
-                            <p:stCondLst>
-                              <p:cond delay="6000"/>
-                            </p:stCondLst>
-                            <p:childTnLst>
-                              <p:par>
-                                <p:cTn id="53" presetID="10" presetClass="entr" presetSubtype="0" fill="hold" nodeType="afterEffect">
-                                  <p:stCondLst>
-                                    <p:cond delay="0"/>
-                                  </p:stCondLst>
-                                  <p:childTnLst>
-                                    <p:set>
-                                      <p:cBhvr>
-                                        <p:cTn id="54" dur="1" fill="hold">
-                                          <p:stCondLst>
-                                            <p:cond delay="0"/>
-                                          </p:stCondLst>
-                                        </p:cTn>
-                                        <p:tgtEl>
-                                          <p:spTgt spid="50"/>
-                                        </p:tgtEl>
-                                        <p:attrNameLst>
-                                          <p:attrName>style.visibility</p:attrName>
-                                        </p:attrNameLst>
-                                      </p:cBhvr>
-                                      <p:to>
-                                        <p:strVal val="visible"/>
-                                      </p:to>
-                                    </p:set>
-                                    <p:animEffect transition="in" filter="fade">
-                                      <p:cBhvr>
-                                        <p:cTn id="55" dur="500"/>
-                                        <p:tgtEl>
-                                          <p:spTgt spid="50"/>
-                                        </p:tgtEl>
-                                      </p:cBhvr>
-                                    </p:animEffect>
-                                  </p:childTnLst>
-                                </p:cTn>
-                              </p:par>
-                            </p:childTnLst>
-                          </p:cTn>
-                        </p:par>
-                        <p:par>
-                          <p:cTn id="56" fill="hold">
-                            <p:stCondLst>
-                              <p:cond delay="6500"/>
-                            </p:stCondLst>
-                            <p:childTnLst>
-                              <p:par>
-                                <p:cTn id="57" presetID="10" presetClass="entr" presetSubtype="0" fill="hold" nodeType="afterEffect">
-                                  <p:stCondLst>
-                                    <p:cond delay="0"/>
-                                  </p:stCondLst>
-                                  <p:childTnLst>
-                                    <p:set>
-                                      <p:cBhvr>
-                                        <p:cTn id="58" dur="1" fill="hold">
-                                          <p:stCondLst>
-                                            <p:cond delay="0"/>
-                                          </p:stCondLst>
-                                        </p:cTn>
-                                        <p:tgtEl>
-                                          <p:spTgt spid="51"/>
-                                        </p:tgtEl>
-                                        <p:attrNameLst>
-                                          <p:attrName>style.visibility</p:attrName>
-                                        </p:attrNameLst>
-                                      </p:cBhvr>
-                                      <p:to>
-                                        <p:strVal val="visible"/>
-                                      </p:to>
-                                    </p:set>
-                                    <p:animEffect transition="in" filter="fade">
-                                      <p:cBhvr>
-                                        <p:cTn id="59" dur="500"/>
-                                        <p:tgtEl>
-                                          <p:spTgt spid="51"/>
-                                        </p:tgtEl>
-                                      </p:cBhvr>
-                                    </p:animEffect>
-                                  </p:childTnLst>
-                                </p:cTn>
-                              </p:par>
-                            </p:childTnLst>
-                          </p:cTn>
-                        </p:par>
-                        <p:par>
-                          <p:cTn id="60" fill="hold">
-                            <p:stCondLst>
-                              <p:cond delay="7000"/>
-                            </p:stCondLst>
-                            <p:childTnLst>
-                              <p:par>
-                                <p:cTn id="61" presetID="10" presetClass="entr" presetSubtype="0" fill="hold" nodeType="afterEffect">
-                                  <p:stCondLst>
-                                    <p:cond delay="0"/>
-                                  </p:stCondLst>
-                                  <p:childTnLst>
-                                    <p:set>
-                                      <p:cBhvr>
-                                        <p:cTn id="62" dur="1" fill="hold">
-                                          <p:stCondLst>
-                                            <p:cond delay="0"/>
-                                          </p:stCondLst>
-                                        </p:cTn>
-                                        <p:tgtEl>
-                                          <p:spTgt spid="52"/>
-                                        </p:tgtEl>
-                                        <p:attrNameLst>
-                                          <p:attrName>style.visibility</p:attrName>
-                                        </p:attrNameLst>
-                                      </p:cBhvr>
-                                      <p:to>
-                                        <p:strVal val="visible"/>
-                                      </p:to>
-                                    </p:set>
-                                    <p:animEffect transition="in" filter="fade">
-                                      <p:cBhvr>
-                                        <p:cTn id="63" dur="500"/>
-                                        <p:tgtEl>
-                                          <p:spTgt spid="52"/>
-                                        </p:tgtEl>
-                                      </p:cBhvr>
-                                    </p:animEffect>
-                                  </p:childTnLst>
-                                </p:cTn>
-                              </p:par>
-                            </p:childTnLst>
-                          </p:cTn>
-                        </p:par>
-                        <p:par>
-                          <p:cTn id="64" fill="hold">
-                            <p:stCondLst>
-                              <p:cond delay="7500"/>
-                            </p:stCondLst>
-                            <p:childTnLst>
-                              <p:par>
-                                <p:cTn id="65" presetID="10" presetClass="entr" presetSubtype="0" fill="hold" nodeType="afterEffect">
-                                  <p:stCondLst>
-                                    <p:cond delay="0"/>
-                                  </p:stCondLst>
-                                  <p:childTnLst>
-                                    <p:set>
-                                      <p:cBhvr>
-                                        <p:cTn id="66" dur="1" fill="hold">
-                                          <p:stCondLst>
-                                            <p:cond delay="0"/>
-                                          </p:stCondLst>
-                                        </p:cTn>
-                                        <p:tgtEl>
-                                          <p:spTgt spid="53"/>
-                                        </p:tgtEl>
-                                        <p:attrNameLst>
-                                          <p:attrName>style.visibility</p:attrName>
-                                        </p:attrNameLst>
-                                      </p:cBhvr>
-                                      <p:to>
-                                        <p:strVal val="visible"/>
-                                      </p:to>
-                                    </p:set>
-                                    <p:animEffect transition="in" filter="fade">
-                                      <p:cBhvr>
-                                        <p:cTn id="67" dur="500"/>
-                                        <p:tgtEl>
-                                          <p:spTgt spid="53"/>
-                                        </p:tgtEl>
-                                      </p:cBhvr>
-                                    </p:animEffect>
-                                  </p:childTnLst>
-                                </p:cTn>
-                              </p:par>
-                            </p:childTnLst>
-                          </p:cTn>
-                        </p:par>
-                        <p:par>
-                          <p:cTn id="68" fill="hold">
-                            <p:stCondLst>
-                              <p:cond delay="8000"/>
-                            </p:stCondLst>
-                            <p:childTnLst>
-                              <p:par>
-                                <p:cTn id="69" presetID="10" presetClass="entr" presetSubtype="0" fill="hold" nodeType="afterEffect">
-                                  <p:stCondLst>
-                                    <p:cond delay="0"/>
-                                  </p:stCondLst>
-                                  <p:childTnLst>
-                                    <p:set>
-                                      <p:cBhvr>
-                                        <p:cTn id="70" dur="1" fill="hold">
-                                          <p:stCondLst>
-                                            <p:cond delay="0"/>
-                                          </p:stCondLst>
-                                        </p:cTn>
-                                        <p:tgtEl>
-                                          <p:spTgt spid="54"/>
-                                        </p:tgtEl>
-                                        <p:attrNameLst>
-                                          <p:attrName>style.visibility</p:attrName>
-                                        </p:attrNameLst>
-                                      </p:cBhvr>
-                                      <p:to>
-                                        <p:strVal val="visible"/>
-                                      </p:to>
-                                    </p:set>
-                                    <p:animEffect transition="in" filter="fade">
-                                      <p:cBhvr>
-                                        <p:cTn id="71" dur="500"/>
-                                        <p:tgtEl>
-                                          <p:spTgt spid="54"/>
-                                        </p:tgtEl>
-                                      </p:cBhvr>
-                                    </p:animEffect>
-                                  </p:childTnLst>
-                                </p:cTn>
-                              </p:par>
-                            </p:childTnLst>
-                          </p:cTn>
-                        </p:par>
-                        <p:par>
-                          <p:cTn id="72" fill="hold">
-                            <p:stCondLst>
-                              <p:cond delay="8500"/>
-                            </p:stCondLst>
-                            <p:childTnLst>
-                              <p:par>
-                                <p:cTn id="73" presetID="10" presetClass="entr" presetSubtype="0" fill="hold" nodeType="afterEffect">
-                                  <p:stCondLst>
-                                    <p:cond delay="0"/>
-                                  </p:stCondLst>
-                                  <p:childTnLst>
-                                    <p:set>
-                                      <p:cBhvr>
-                                        <p:cTn id="74" dur="1" fill="hold">
-                                          <p:stCondLst>
-                                            <p:cond delay="0"/>
-                                          </p:stCondLst>
-                                        </p:cTn>
-                                        <p:tgtEl>
-                                          <p:spTgt spid="55"/>
-                                        </p:tgtEl>
-                                        <p:attrNameLst>
-                                          <p:attrName>style.visibility</p:attrName>
-                                        </p:attrNameLst>
-                                      </p:cBhvr>
-                                      <p:to>
-                                        <p:strVal val="visible"/>
-                                      </p:to>
-                                    </p:set>
-                                    <p:animEffect transition="in" filter="fade">
-                                      <p:cBhvr>
-                                        <p:cTn id="75" dur="500"/>
-                                        <p:tgtEl>
-                                          <p:spTgt spid="55"/>
-                                        </p:tgtEl>
-                                      </p:cBhvr>
-                                    </p:animEffect>
-                                  </p:childTnLst>
-                                </p:cTn>
-                              </p:par>
-                            </p:childTnLst>
-                          </p:cTn>
-                        </p:par>
-                        <p:par>
-                          <p:cTn id="76" fill="hold">
-                            <p:stCondLst>
-                              <p:cond delay="9000"/>
-                            </p:stCondLst>
-                            <p:childTnLst>
-                              <p:par>
-                                <p:cTn id="77" presetID="10" presetClass="entr" presetSubtype="0" fill="hold" nodeType="afterEffect">
-                                  <p:stCondLst>
-                                    <p:cond delay="0"/>
-                                  </p:stCondLst>
-                                  <p:childTnLst>
-                                    <p:set>
-                                      <p:cBhvr>
-                                        <p:cTn id="78" dur="1" fill="hold">
-                                          <p:stCondLst>
-                                            <p:cond delay="0"/>
-                                          </p:stCondLst>
-                                        </p:cTn>
-                                        <p:tgtEl>
-                                          <p:spTgt spid="56"/>
-                                        </p:tgtEl>
-                                        <p:attrNameLst>
-                                          <p:attrName>style.visibility</p:attrName>
-                                        </p:attrNameLst>
-                                      </p:cBhvr>
-                                      <p:to>
-                                        <p:strVal val="visible"/>
-                                      </p:to>
-                                    </p:set>
-                                    <p:animEffect transition="in" filter="fade">
-                                      <p:cBhvr>
-                                        <p:cTn id="79" dur="500"/>
-                                        <p:tgtEl>
-                                          <p:spTgt spid="56"/>
-                                        </p:tgtEl>
-                                      </p:cBhvr>
-                                    </p:animEffect>
-                                  </p:childTnLst>
-                                </p:cTn>
-                              </p:par>
-                            </p:childTnLst>
-                          </p:cTn>
-                        </p:par>
-                      </p:childTnLst>
-                    </p:cTn>
-                  </p:par>
-                </p:childTnLst>
-              </p:cTn>
-              <p:prevCondLst>
-                <p:cond evt="onPrev" delay="0">
-                  <p:tgtEl>
-                    <p:sldTgt/>
-                  </p:tgtEl>
-                </p:cond>
-              </p:prevCondLst>
-              <p:nextCondLst>
-                <p:cond evt="onNext" delay="0">
-                  <p:tgtEl>
-                    <p:sldTgt/>
-                  </p:tgtEl>
-                </p:cond>
-              </p:nextCondLst>
-            </p:seq>
-          </p:childTnLst>
-        </p:cTn>
+        <p:cTn id="1" dur="indefinite" restart="never" nodeType="tmRoot"/>
       </p:par>
     </p:tnLst>
   </p:timing>
@@ -12136,7 +12525,7 @@
                 <a:latin typeface="Aharoni" panose="02010803020104030203" pitchFamily="2" charset="-79"/>
                 <a:cs typeface="Aharoni" panose="02010803020104030203" pitchFamily="2" charset="-79"/>
               </a:rPr>
-              <a:t>Génération de code : Démonstration</a:t>
+              <a:t>Démonstration : Le nuage magique</a:t>
             </a:r>
             <a:endParaRPr lang="fr-FR" sz="2400" cap="all" dirty="0">
               <a:solidFill>
@@ -12169,6 +12558,54 @@
               <a:t>7</a:t>
             </a:fld>
             <a:endParaRPr lang="fr-FR" dirty="0"/>
+          </a:p>
+        </p:txBody>
+      </p:sp>
+      <p:sp>
+        <p:nvSpPr>
+          <p:cNvPr id="4" name="ZoneTexte 3"/>
+          <p:cNvSpPr txBox="1"/>
+          <p:nvPr/>
+        </p:nvSpPr>
+        <p:spPr>
+          <a:xfrm>
+            <a:off x="2482469" y="6482458"/>
+            <a:ext cx="3962400" cy="338554"/>
+          </a:xfrm>
+          <a:prstGeom prst="rect">
+            <a:avLst/>
+          </a:prstGeom>
+          <a:noFill/>
+        </p:spPr>
+        <p:txBody>
+          <a:bodyPr wrap="square" rtlCol="0">
+            <a:spAutoFit/>
+          </a:bodyPr>
+          <a:lstStyle/>
+          <a:p>
+            <a:r>
+              <a:rPr lang="fr-FR" sz="1600" i="1" dirty="0" smtClean="0">
+                <a:solidFill>
+                  <a:schemeClr val="tx1">
+                    <a:lumMod val="65000"/>
+                    <a:lumOff val="35000"/>
+                  </a:schemeClr>
+                </a:solidFill>
+                <a:latin typeface="Segoe UI" panose="020B0502040204020203" pitchFamily="34" charset="0"/>
+                <a:cs typeface="Segoe UI" panose="020B0502040204020203" pitchFamily="34" charset="0"/>
+              </a:rPr>
+              <a:t>Sources images : http://flaticon.com/</a:t>
+            </a:r>
+            <a:endParaRPr lang="fr-FR" sz="1600" i="1" dirty="0">
+              <a:solidFill>
+                <a:schemeClr val="tx1">
+                  <a:lumMod val="65000"/>
+                  <a:lumOff val="35000"/>
+                </a:schemeClr>
+              </a:solidFill>
+              <a:latin typeface="Segoe UI" panose="020B0502040204020203" pitchFamily="34" charset="0"/>
+              <a:cs typeface="Segoe UI" panose="020B0502040204020203" pitchFamily="34" charset="0"/>
+            </a:endParaRPr>
           </a:p>
         </p:txBody>
       </p:sp>

</xml_diff>

<commit_message>
Project report + main comments on all classes
</commit_message>
<xml_diff>
--- a/Demonstration/Demo_JXS.pptx
+++ b/Demonstration/Demo_JXS.pptx
@@ -4893,7 +4893,7 @@
         </p:nvGrpSpPr>
         <p:grpSpPr>
           <a:xfrm>
-            <a:off x="1248903" y="1001220"/>
+            <a:off x="750139" y="2566784"/>
             <a:ext cx="2923309" cy="4041835"/>
             <a:chOff x="6129142" y="1000731"/>
             <a:chExt cx="2923309" cy="4041835"/>
@@ -5022,7 +5022,7 @@
         </p:nvGrpSpPr>
         <p:grpSpPr>
           <a:xfrm>
-            <a:off x="5860679" y="971939"/>
+            <a:off x="4530643" y="3567441"/>
             <a:ext cx="2923309" cy="3041178"/>
             <a:chOff x="6129142" y="1000731"/>
             <a:chExt cx="2923309" cy="3041178"/>
@@ -5237,7 +5237,7 @@
         </p:blipFill>
         <p:spPr>
           <a:xfrm>
-            <a:off x="6052940" y="1887555"/>
+            <a:off x="4722904" y="4483057"/>
             <a:ext cx="1529308" cy="411384"/>
           </a:xfrm>
           <a:prstGeom prst="rect">
@@ -5266,7 +5266,7 @@
         </p:blipFill>
         <p:spPr>
           <a:xfrm>
-            <a:off x="1434607" y="1916836"/>
+            <a:off x="935843" y="3482400"/>
             <a:ext cx="690840" cy="705084"/>
           </a:xfrm>
           <a:prstGeom prst="rect">
@@ -5282,7 +5282,7 @@
         </p:nvSpPr>
         <p:spPr>
           <a:xfrm>
-            <a:off x="1585141" y="1141592"/>
+            <a:off x="1086377" y="2707156"/>
             <a:ext cx="2250830" cy="461665"/>
           </a:xfrm>
           <a:prstGeom prst="rect">
@@ -5339,7 +5339,7 @@
         </p:nvSpPr>
         <p:spPr>
           <a:xfrm>
-            <a:off x="6196918" y="1112311"/>
+            <a:off x="4866882" y="3707813"/>
             <a:ext cx="2250830" cy="461665"/>
           </a:xfrm>
           <a:prstGeom prst="rect">
@@ -5409,7 +5409,7 @@
         </p:blipFill>
         <p:spPr>
           <a:xfrm>
-            <a:off x="1449436" y="2775396"/>
+            <a:off x="950672" y="4340960"/>
             <a:ext cx="661181" cy="668215"/>
           </a:xfrm>
           <a:prstGeom prst="rect">
@@ -5425,7 +5425,7 @@
         </p:nvSpPr>
         <p:spPr>
           <a:xfrm>
-            <a:off x="2237988" y="1975436"/>
+            <a:off x="1739224" y="3541000"/>
             <a:ext cx="1821683" cy="400110"/>
           </a:xfrm>
           <a:prstGeom prst="rect">
@@ -5468,7 +5468,7 @@
         </p:nvSpPr>
         <p:spPr>
           <a:xfrm>
-            <a:off x="2230573" y="2888412"/>
+            <a:off x="1731809" y="4453976"/>
             <a:ext cx="1821683" cy="400110"/>
           </a:xfrm>
           <a:prstGeom prst="rect">
@@ -5511,7 +5511,7 @@
         </p:nvSpPr>
         <p:spPr>
           <a:xfrm>
-            <a:off x="1434607" y="3611511"/>
+            <a:off x="935843" y="5177075"/>
             <a:ext cx="2490742" cy="1323439"/>
           </a:xfrm>
           <a:prstGeom prst="rect">
@@ -5602,7 +5602,7 @@
         </p:nvSpPr>
         <p:spPr>
           <a:xfrm>
-            <a:off x="7582249" y="1912472"/>
+            <a:off x="6252213" y="4507974"/>
             <a:ext cx="1096344" cy="400110"/>
           </a:xfrm>
           <a:prstGeom prst="rect">
@@ -5638,7 +5638,7 @@
         </p:nvSpPr>
         <p:spPr>
           <a:xfrm>
-            <a:off x="7582249" y="3319302"/>
+            <a:off x="6252213" y="5914804"/>
             <a:ext cx="1201740" cy="400110"/>
           </a:xfrm>
           <a:prstGeom prst="rect">
@@ -5689,7 +5689,7 @@
         </p:blipFill>
         <p:spPr>
           <a:xfrm>
-            <a:off x="6052940" y="2452415"/>
+            <a:off x="4722904" y="5047917"/>
             <a:ext cx="599905" cy="706555"/>
           </a:xfrm>
           <a:prstGeom prst="rect">
@@ -5705,7 +5705,7 @@
         </p:nvSpPr>
         <p:spPr>
           <a:xfrm>
-            <a:off x="7582249" y="2601614"/>
+            <a:off x="6252213" y="5197116"/>
             <a:ext cx="1201740" cy="400110"/>
           </a:xfrm>
           <a:prstGeom prst="rect">
@@ -5762,6 +5762,88 @@
           </a:p>
         </p:txBody>
       </p:sp>
+      <p:pic>
+        <p:nvPicPr>
+          <p:cNvPr id="1026" name="Picture 2" descr="https://lh4.googleusercontent.com/vui2Iesu0bxY28kmww5X80UjRGymfCHS4xpf3HTn4XlQcCyov-AlFSqAsd1iyz5htxrUI1trAWwf6EHMDU8Z48NDtZe2odb3IrmYTiINh7jBEypfKuMSX4YoOhOEhud8PcvebBAJ"/>
+          <p:cNvPicPr>
+            <a:picLocks noChangeAspect="1" noChangeArrowheads="1"/>
+          </p:cNvPicPr>
+          <p:nvPr/>
+        </p:nvPicPr>
+        <p:blipFill>
+          <a:blip r:embed="rId8">
+            <a:extLst>
+              <a:ext uri="{28A0092B-C50C-407E-A947-70E740481C1C}">
+                <a14:useLocalDpi xmlns:a14="http://schemas.microsoft.com/office/drawing/2010/main" val="0"/>
+              </a:ext>
+            </a:extLst>
+          </a:blip>
+          <a:srcRect/>
+          <a:stretch>
+            <a:fillRect/>
+          </a:stretch>
+        </p:blipFill>
+        <p:spPr bwMode="auto">
+          <a:xfrm>
+            <a:off x="585616" y="642059"/>
+            <a:ext cx="1778409" cy="1778409"/>
+          </a:xfrm>
+          <a:prstGeom prst="rect">
+            <a:avLst/>
+          </a:prstGeom>
+          <a:noFill/>
+          <a:extLst>
+            <a:ext uri="{909E8E84-426E-40DD-AFC4-6F175D3DCCD1}">
+              <a14:hiddenFill xmlns:a14="http://schemas.microsoft.com/office/drawing/2010/main">
+                <a:solidFill>
+                  <a:srgbClr val="FFFFFF"/>
+                </a:solidFill>
+              </a14:hiddenFill>
+            </a:ext>
+          </a:extLst>
+        </p:spPr>
+      </p:pic>
+      <p:pic>
+        <p:nvPicPr>
+          <p:cNvPr id="1028" name="Picture 4" descr="Résultat de recherche d'images pour &quot;trello icon&quot;"/>
+          <p:cNvPicPr>
+            <a:picLocks noChangeAspect="1" noChangeArrowheads="1"/>
+          </p:cNvPicPr>
+          <p:nvPr/>
+        </p:nvPicPr>
+        <p:blipFill>
+          <a:blip r:embed="rId9" cstate="print">
+            <a:extLst>
+              <a:ext uri="{28A0092B-C50C-407E-A947-70E740481C1C}">
+                <a14:useLocalDpi xmlns:a14="http://schemas.microsoft.com/office/drawing/2010/main" val="0"/>
+              </a:ext>
+            </a:extLst>
+          </a:blip>
+          <a:srcRect/>
+          <a:stretch>
+            <a:fillRect/>
+          </a:stretch>
+        </p:blipFill>
+        <p:spPr bwMode="auto">
+          <a:xfrm>
+            <a:off x="2748881" y="801928"/>
+            <a:ext cx="1339622" cy="1339622"/>
+          </a:xfrm>
+          <a:prstGeom prst="rect">
+            <a:avLst/>
+          </a:prstGeom>
+          <a:noFill/>
+          <a:extLst>
+            <a:ext uri="{909E8E84-426E-40DD-AFC4-6F175D3DCCD1}">
+              <a14:hiddenFill xmlns:a14="http://schemas.microsoft.com/office/drawing/2010/main">
+                <a:solidFill>
+                  <a:srgbClr val="FFFFFF"/>
+                </a:solidFill>
+              </a14:hiddenFill>
+            </a:ext>
+          </a:extLst>
+        </p:spPr>
+      </p:pic>
     </p:spTree>
     <p:extLst>
       <p:ext uri="{BB962C8B-B14F-4D97-AF65-F5344CB8AC3E}">
@@ -6647,14 +6729,7 @@
                 <a:latin typeface="Segoe UI" panose="020B0502040204020203" pitchFamily="34" charset="0"/>
                 <a:cs typeface="Segoe UI" panose="020B0502040204020203" pitchFamily="34" charset="0"/>
               </a:rPr>
-              <a:t>Fusion </a:t>
-            </a:r>
-            <a:r>
-              <a:rPr lang="fr-FR" dirty="0" smtClean="0">
-                <a:latin typeface="Segoe UI" panose="020B0502040204020203" pitchFamily="34" charset="0"/>
-                <a:cs typeface="Segoe UI" panose="020B0502040204020203" pitchFamily="34" charset="0"/>
-              </a:rPr>
-              <a:t>des fichiers</a:t>
+              <a:t>Fusion des fichiers</a:t>
             </a:r>
           </a:p>
         </p:txBody>

</xml_diff>